<commit_message>
created a couple of slides for the document
</commit_message>
<xml_diff>
--- a/Data Analytics Challenge Final PowerPoint.pptx
+++ b/Data Analytics Challenge Final PowerPoint.pptx
@@ -8,7 +8,14 @@
     <p:sldId id="256" r:id="rId2"/>
     <p:sldId id="257" r:id="rId3"/>
     <p:sldId id="259" r:id="rId4"/>
-    <p:sldId id="258" r:id="rId5"/>
+    <p:sldId id="266" r:id="rId5"/>
+    <p:sldId id="260" r:id="rId6"/>
+    <p:sldId id="261" r:id="rId7"/>
+    <p:sldId id="262" r:id="rId8"/>
+    <p:sldId id="263" r:id="rId9"/>
+    <p:sldId id="264" r:id="rId10"/>
+    <p:sldId id="265" r:id="rId11"/>
+    <p:sldId id="258" r:id="rId12"/>
   </p:sldIdLst>
   <p:sldSz cx="12192000" cy="6858000"/>
   <p:notesSz cx="6858000" cy="9144000"/>
@@ -298,7 +305,7 @@
           <a:p>
             <a:fld id="{7F872B37-9ECC-448D-B8DA-4D5FD120384B}" type="datetimeFigureOut">
               <a:rPr lang="en-US" smtClean="0"/>
-              <a:t>12/4/2014</a:t>
+              <a:t>12/4/14</a:t>
             </a:fld>
             <a:endParaRPr lang="en-US"/>
           </a:p>
@@ -636,7 +643,7 @@
           <a:p>
             <a:fld id="{7F872B37-9ECC-448D-B8DA-4D5FD120384B}" type="datetimeFigureOut">
               <a:rPr lang="en-US" smtClean="0"/>
-              <a:t>12/4/2014</a:t>
+              <a:t>12/4/14</a:t>
             </a:fld>
             <a:endParaRPr lang="en-US"/>
           </a:p>
@@ -1037,7 +1044,7 @@
           <a:p>
             <a:fld id="{7F872B37-9ECC-448D-B8DA-4D5FD120384B}" type="datetimeFigureOut">
               <a:rPr lang="en-US" smtClean="0"/>
-              <a:t>12/4/2014</a:t>
+              <a:t>12/4/14</a:t>
             </a:fld>
             <a:endParaRPr lang="en-US"/>
           </a:p>
@@ -1373,7 +1380,7 @@
           <a:p>
             <a:fld id="{7F872B37-9ECC-448D-B8DA-4D5FD120384B}" type="datetimeFigureOut">
               <a:rPr lang="en-US" smtClean="0"/>
-              <a:t>12/4/2014</a:t>
+              <a:t>12/4/14</a:t>
             </a:fld>
             <a:endParaRPr lang="en-US"/>
           </a:p>
@@ -1693,7 +1700,7 @@
           <a:p>
             <a:fld id="{7F872B37-9ECC-448D-B8DA-4D5FD120384B}" type="datetimeFigureOut">
               <a:rPr lang="en-US" smtClean="0"/>
-              <a:t>12/4/2014</a:t>
+              <a:t>12/4/14</a:t>
             </a:fld>
             <a:endParaRPr lang="en-US"/>
           </a:p>
@@ -2089,7 +2096,7 @@
           <a:p>
             <a:fld id="{7F872B37-9ECC-448D-B8DA-4D5FD120384B}" type="datetimeFigureOut">
               <a:rPr lang="en-US" smtClean="0"/>
-              <a:t>12/4/2014</a:t>
+              <a:t>12/4/14</a:t>
             </a:fld>
             <a:endParaRPr lang="en-US"/>
           </a:p>
@@ -2346,7 +2353,7 @@
           <a:p>
             <a:fld id="{7F872B37-9ECC-448D-B8DA-4D5FD120384B}" type="datetimeFigureOut">
               <a:rPr lang="en-US" smtClean="0"/>
-              <a:t>12/4/2014</a:t>
+              <a:t>12/4/14</a:t>
             </a:fld>
             <a:endParaRPr lang="en-US"/>
           </a:p>
@@ -2608,7 +2615,7 @@
           <a:p>
             <a:fld id="{7F872B37-9ECC-448D-B8DA-4D5FD120384B}" type="datetimeFigureOut">
               <a:rPr lang="en-US" smtClean="0"/>
-              <a:t>12/4/2014</a:t>
+              <a:t>12/4/14</a:t>
             </a:fld>
             <a:endParaRPr lang="en-US"/>
           </a:p>
@@ -2870,7 +2877,7 @@
           <a:p>
             <a:fld id="{7F872B37-9ECC-448D-B8DA-4D5FD120384B}" type="datetimeFigureOut">
               <a:rPr lang="en-US" smtClean="0"/>
-              <a:t>12/4/2014</a:t>
+              <a:t>12/4/14</a:t>
             </a:fld>
             <a:endParaRPr lang="en-US"/>
           </a:p>
@@ -3199,7 +3206,7 @@
           <a:p>
             <a:fld id="{7F872B37-9ECC-448D-B8DA-4D5FD120384B}" type="datetimeFigureOut">
               <a:rPr lang="en-US" smtClean="0"/>
-              <a:t>12/4/2014</a:t>
+              <a:t>12/4/14</a:t>
             </a:fld>
             <a:endParaRPr lang="en-US"/>
           </a:p>
@@ -3522,7 +3529,7 @@
           <a:p>
             <a:fld id="{7F872B37-9ECC-448D-B8DA-4D5FD120384B}" type="datetimeFigureOut">
               <a:rPr lang="en-US" smtClean="0"/>
-              <a:t>12/4/2014</a:t>
+              <a:t>12/4/14</a:t>
             </a:fld>
             <a:endParaRPr lang="en-US"/>
           </a:p>
@@ -3979,7 +3986,7 @@
           <a:p>
             <a:fld id="{7F872B37-9ECC-448D-B8DA-4D5FD120384B}" type="datetimeFigureOut">
               <a:rPr lang="en-US" smtClean="0"/>
-              <a:t>12/4/2014</a:t>
+              <a:t>12/4/14</a:t>
             </a:fld>
             <a:endParaRPr lang="en-US"/>
           </a:p>
@@ -4184,7 +4191,7 @@
           <a:p>
             <a:fld id="{7F872B37-9ECC-448D-B8DA-4D5FD120384B}" type="datetimeFigureOut">
               <a:rPr lang="en-US" smtClean="0"/>
-              <a:t>12/4/2014</a:t>
+              <a:t>12/4/14</a:t>
             </a:fld>
             <a:endParaRPr lang="en-US"/>
           </a:p>
@@ -4361,7 +4368,7 @@
           <a:p>
             <a:fld id="{7F872B37-9ECC-448D-B8DA-4D5FD120384B}" type="datetimeFigureOut">
               <a:rPr lang="en-US" smtClean="0"/>
-              <a:t>12/4/2014</a:t>
+              <a:t>12/4/14</a:t>
             </a:fld>
             <a:endParaRPr lang="en-US"/>
           </a:p>
@@ -4694,7 +4701,7 @@
           <a:p>
             <a:fld id="{7F872B37-9ECC-448D-B8DA-4D5FD120384B}" type="datetimeFigureOut">
               <a:rPr lang="en-US" smtClean="0"/>
-              <a:t>12/4/2014</a:t>
+              <a:t>12/4/14</a:t>
             </a:fld>
             <a:endParaRPr lang="en-US"/>
           </a:p>
@@ -5039,7 +5046,7 @@
           <a:p>
             <a:fld id="{7F872B37-9ECC-448D-B8DA-4D5FD120384B}" type="datetimeFigureOut">
               <a:rPr lang="en-US" smtClean="0"/>
-              <a:t>12/4/2014</a:t>
+              <a:t>12/4/14</a:t>
             </a:fld>
             <a:endParaRPr lang="en-US"/>
           </a:p>
@@ -7156,7 +7163,7 @@
           <a:p>
             <a:fld id="{7F872B37-9ECC-448D-B8DA-4D5FD120384B}" type="datetimeFigureOut">
               <a:rPr lang="en-US" smtClean="0"/>
-              <a:t>12/4/2014</a:t>
+              <a:t>12/4/14</a:t>
             </a:fld>
             <a:endParaRPr lang="en-US"/>
           </a:p>
@@ -7756,7 +7763,226 @@
   <p:timing>
     <p:tnLst>
       <p:par>
-        <p:cTn id="1" dur="indefinite" restart="never" nodeType="tmRoot"/>
+        <p:cTn xmlns:p14="http://schemas.microsoft.com/office/powerpoint/2010/main" id="1" dur="indefinite" restart="never" nodeType="tmRoot"/>
+      </p:par>
+    </p:tnLst>
+  </p:timing>
+</p:sld>
+</file>
+
+<file path=ppt/slides/slide10.xml><?xml version="1.0" encoding="utf-8"?>
+<p:sld xmlns:a="http://schemas.openxmlformats.org/drawingml/2006/main" xmlns:r="http://schemas.openxmlformats.org/officeDocument/2006/relationships" xmlns:p="http://schemas.openxmlformats.org/presentationml/2006/main">
+  <p:cSld>
+    <p:spTree>
+      <p:nvGrpSpPr>
+        <p:cNvPr id="1" name=""/>
+        <p:cNvGrpSpPr/>
+        <p:nvPr/>
+      </p:nvGrpSpPr>
+      <p:grpSpPr>
+        <a:xfrm>
+          <a:off x="0" y="0"/>
+          <a:ext cx="0" cy="0"/>
+          <a:chOff x="0" y="0"/>
+          <a:chExt cx="0" cy="0"/>
+        </a:xfrm>
+      </p:grpSpPr>
+      <p:sp>
+        <p:nvSpPr>
+          <p:cNvPr id="2" name="Title 1"/>
+          <p:cNvSpPr>
+            <a:spLocks noGrp="1"/>
+          </p:cNvSpPr>
+          <p:nvPr>
+            <p:ph type="title"/>
+          </p:nvPr>
+        </p:nvSpPr>
+        <p:spPr/>
+        <p:txBody>
+          <a:bodyPr/>
+          <a:lstStyle/>
+          <a:p>
+            <a:r>
+              <a:rPr lang="en-US" dirty="0" smtClean="0"/>
+              <a:t>Job History</a:t>
+            </a:r>
+            <a:endParaRPr lang="en-US" dirty="0"/>
+          </a:p>
+        </p:txBody>
+      </p:sp>
+      <p:sp>
+        <p:nvSpPr>
+          <p:cNvPr id="3" name="Content Placeholder 2"/>
+          <p:cNvSpPr>
+            <a:spLocks noGrp="1"/>
+          </p:cNvSpPr>
+          <p:nvPr>
+            <p:ph idx="1"/>
+          </p:nvPr>
+        </p:nvSpPr>
+        <p:spPr/>
+        <p:txBody>
+          <a:bodyPr/>
+          <a:lstStyle/>
+          <a:p>
+            <a:r>
+              <a:rPr lang="en-US" dirty="0" smtClean="0"/>
+              <a:t>The job history threat determined by one record </a:t>
+            </a:r>
+          </a:p>
+          <a:p>
+            <a:pPr lvl="1"/>
+            <a:r>
+              <a:rPr lang="en-US" dirty="0" smtClean="0"/>
+              <a:t>How have their performance reviews been</a:t>
+            </a:r>
+          </a:p>
+          <a:p>
+            <a:r>
+              <a:rPr lang="en-US" dirty="0" smtClean="0"/>
+              <a:t>Software walkthrough </a:t>
+            </a:r>
+          </a:p>
+          <a:p>
+            <a:pPr lvl="1"/>
+            <a:r>
+              <a:rPr lang="en-US" dirty="0" smtClean="0"/>
+              <a:t>Imports the employee class to use each employee’s name</a:t>
+            </a:r>
+          </a:p>
+          <a:p>
+            <a:pPr lvl="1"/>
+            <a:r>
+              <a:rPr lang="en-US" dirty="0" smtClean="0"/>
+              <a:t>Searches through the document for the employee name</a:t>
+            </a:r>
+          </a:p>
+          <a:p>
+            <a:pPr lvl="1"/>
+            <a:r>
+              <a:rPr lang="en-US" dirty="0" smtClean="0"/>
+              <a:t>Checks comments for each review (All from a drop down)</a:t>
+            </a:r>
+          </a:p>
+          <a:p>
+            <a:pPr lvl="1"/>
+            <a:r>
+              <a:rPr lang="en-US" dirty="0" smtClean="0"/>
+              <a:t>Each string has different threat level</a:t>
+            </a:r>
+          </a:p>
+          <a:p>
+            <a:pPr lvl="1"/>
+            <a:r>
+              <a:rPr lang="en-US" dirty="0" smtClean="0"/>
+              <a:t>Averages all the threats and saves to employee class</a:t>
+            </a:r>
+            <a:endParaRPr lang="en-US" dirty="0"/>
+          </a:p>
+        </p:txBody>
+      </p:sp>
+    </p:spTree>
+    <p:extLst>
+      <p:ext uri="{BB962C8B-B14F-4D97-AF65-F5344CB8AC3E}">
+        <p14:creationId xmlns:p14="http://schemas.microsoft.com/office/powerpoint/2010/main" val="2157438941"/>
+      </p:ext>
+    </p:extLst>
+  </p:cSld>
+  <p:clrMapOvr>
+    <a:masterClrMapping/>
+  </p:clrMapOvr>
+</p:sld>
+</file>
+
+<file path=ppt/slides/slide11.xml><?xml version="1.0" encoding="utf-8"?>
+<p:sld xmlns:a="http://schemas.openxmlformats.org/drawingml/2006/main" xmlns:r="http://schemas.openxmlformats.org/officeDocument/2006/relationships" xmlns:p="http://schemas.openxmlformats.org/presentationml/2006/main">
+  <p:cSld>
+    <p:spTree>
+      <p:nvGrpSpPr>
+        <p:cNvPr id="1" name=""/>
+        <p:cNvGrpSpPr/>
+        <p:nvPr/>
+      </p:nvGrpSpPr>
+      <p:grpSpPr>
+        <a:xfrm>
+          <a:off x="0" y="0"/>
+          <a:ext cx="0" cy="0"/>
+          <a:chOff x="0" y="0"/>
+          <a:chExt cx="0" cy="0"/>
+        </a:xfrm>
+      </p:grpSpPr>
+      <p:sp>
+        <p:nvSpPr>
+          <p:cNvPr id="2" name="Title 1"/>
+          <p:cNvSpPr>
+            <a:spLocks noGrp="1"/>
+          </p:cNvSpPr>
+          <p:nvPr>
+            <p:ph type="title"/>
+          </p:nvPr>
+        </p:nvSpPr>
+        <p:spPr/>
+        <p:txBody>
+          <a:bodyPr/>
+          <a:lstStyle/>
+          <a:p>
+            <a:r>
+              <a:rPr lang="en-US" dirty="0" smtClean="0"/>
+              <a:t>THE END</a:t>
+            </a:r>
+            <a:endParaRPr lang="en-US" dirty="0"/>
+          </a:p>
+        </p:txBody>
+      </p:sp>
+      <p:sp>
+        <p:nvSpPr>
+          <p:cNvPr id="3" name="Content Placeholder 2"/>
+          <p:cNvSpPr>
+            <a:spLocks noGrp="1"/>
+          </p:cNvSpPr>
+          <p:nvPr>
+            <p:ph idx="1"/>
+          </p:nvPr>
+        </p:nvSpPr>
+        <p:spPr/>
+        <p:txBody>
+          <a:bodyPr/>
+          <a:lstStyle/>
+          <a:p>
+            <a:r>
+              <a:rPr lang="en-US" dirty="0">
+                <a:hlinkClick r:id="rId2"/>
+              </a:rPr>
+              <a:t>http://104.131.39.157</a:t>
+            </a:r>
+            <a:r>
+              <a:rPr lang="en-US" dirty="0" smtClean="0">
+                <a:hlinkClick r:id="rId2"/>
+              </a:rPr>
+              <a:t>/</a:t>
+            </a:r>
+            <a:r>
+              <a:rPr lang="en-US" dirty="0" smtClean="0"/>
+              <a:t> </a:t>
+            </a:r>
+            <a:endParaRPr lang="en-US" dirty="0"/>
+          </a:p>
+        </p:txBody>
+      </p:sp>
+    </p:spTree>
+    <p:extLst>
+      <p:ext uri="{BB962C8B-B14F-4D97-AF65-F5344CB8AC3E}">
+        <p14:creationId xmlns:p14="http://schemas.microsoft.com/office/powerpoint/2010/main" val="432334292"/>
+      </p:ext>
+    </p:extLst>
+  </p:cSld>
+  <p:clrMapOvr>
+    <a:masterClrMapping/>
+  </p:clrMapOvr>
+  <p:timing>
+    <p:tnLst>
+      <p:par>
+        <p:cTn xmlns:p14="http://schemas.microsoft.com/office/powerpoint/2010/main" id="1" dur="indefinite" restart="never" nodeType="tmRoot"/>
       </p:par>
     </p:tnLst>
   </p:timing>
@@ -7839,8 +8065,17 @@
             <a:pPr lvl="1"/>
             <a:r>
               <a:rPr lang="en-US" dirty="0" smtClean="0"/>
-              <a:t>Have to use predictive analysis to provide each employee with a threat level.</a:t>
-            </a:r>
+              <a:t>Have to use predictive analysis to provide each employee with a threat level</a:t>
+            </a:r>
+            <a:r>
+              <a:rPr lang="en-US" dirty="0" smtClean="0"/>
+              <a:t>. (Inconsistent phon</a:t>
+            </a:r>
+            <a:r>
+              <a:rPr lang="en-US" dirty="0" smtClean="0"/>
+              <a:t>e records, or flight plans)</a:t>
+            </a:r>
+            <a:endParaRPr lang="en-US" dirty="0" smtClean="0"/>
           </a:p>
           <a:p>
             <a:pPr marL="457200" lvl="1" indent="0">
@@ -7852,7 +8087,15 @@
             <a:pPr lvl="1"/>
             <a:r>
               <a:rPr lang="en-US" dirty="0" smtClean="0"/>
-              <a:t>Identify top potential insider threats.  </a:t>
+              <a:t>Identify top potential insider </a:t>
+            </a:r>
+            <a:r>
+              <a:rPr lang="en-US" dirty="0" smtClean="0"/>
+              <a:t>threats</a:t>
+            </a:r>
+            <a:r>
+              <a:rPr lang="en-US" dirty="0" smtClean="0"/>
+              <a:t>, for each department, and company wide.</a:t>
             </a:r>
             <a:endParaRPr lang="en-US" dirty="0"/>
           </a:p>
@@ -7871,7 +8114,7 @@
   <p:timing>
     <p:tnLst>
       <p:par>
-        <p:cTn id="1" dur="indefinite" restart="never" nodeType="tmRoot"/>
+        <p:cTn xmlns:p14="http://schemas.microsoft.com/office/powerpoint/2010/main" id="1" dur="indefinite" restart="never" nodeType="tmRoot"/>
       </p:par>
     </p:tnLst>
   </p:timing>
@@ -7974,7 +8217,7 @@
   <p:timing>
     <p:tnLst>
       <p:par>
-        <p:cTn id="1" dur="indefinite" restart="never" nodeType="tmRoot"/>
+        <p:cTn xmlns:p14="http://schemas.microsoft.com/office/powerpoint/2010/main" id="1" dur="indefinite" restart="never" nodeType="tmRoot"/>
       </p:par>
     </p:tnLst>
   </p:timing>
@@ -8015,7 +8258,7 @@
           <a:p>
             <a:r>
               <a:rPr lang="en-US" dirty="0" smtClean="0"/>
-              <a:t>THE END</a:t>
+              <a:t>Main Function</a:t>
             </a:r>
             <a:endParaRPr lang="en-US" dirty="0"/>
           </a:p>
@@ -8037,20 +8280,42 @@
           <a:lstStyle/>
           <a:p>
             <a:r>
-              <a:rPr lang="en-US" dirty="0">
-                <a:hlinkClick r:id="rId2"/>
-              </a:rPr>
-              <a:t>http://104.131.39.157</a:t>
-            </a:r>
-            <a:r>
-              <a:rPr lang="en-US" dirty="0" smtClean="0">
-                <a:hlinkClick r:id="rId2"/>
-              </a:rPr>
-              <a:t>/</a:t>
-            </a:r>
-            <a:r>
               <a:rPr lang="en-US" dirty="0" smtClean="0"/>
-              <a:t> </a:t>
+              <a:t>We open the excel document using a read function</a:t>
+            </a:r>
+          </a:p>
+          <a:p>
+            <a:r>
+              <a:rPr lang="en-US" dirty="0" smtClean="0"/>
+              <a:t>On the basic information page we gather or searching criteria</a:t>
+            </a:r>
+          </a:p>
+          <a:p>
+            <a:r>
+              <a:rPr lang="en-US" dirty="0" smtClean="0"/>
+              <a:t>We save all of this criteria to an employee class</a:t>
+            </a:r>
+          </a:p>
+          <a:p>
+            <a:r>
+              <a:rPr lang="en-US" dirty="0" smtClean="0"/>
+              <a:t>This class is very important because we use it in all of the functions </a:t>
+            </a:r>
+          </a:p>
+          <a:p>
+            <a:r>
+              <a:rPr lang="en-US" dirty="0" smtClean="0"/>
+              <a:t>We save all of the information for each class in the main</a:t>
+            </a:r>
+          </a:p>
+          <a:p>
+            <a:r>
+              <a:rPr lang="en-US" dirty="0" smtClean="0"/>
+              <a:t>After we have iterating through the document we write the output to a .</a:t>
+            </a:r>
+            <a:r>
+              <a:rPr lang="en-US" smtClean="0"/>
+              <a:t>csv  </a:t>
             </a:r>
             <a:endParaRPr lang="en-US" dirty="0"/>
           </a:p>
@@ -8059,20 +8324,622 @@
     </p:spTree>
     <p:extLst>
       <p:ext uri="{BB962C8B-B14F-4D97-AF65-F5344CB8AC3E}">
-        <p14:creationId xmlns:p14="http://schemas.microsoft.com/office/powerpoint/2010/main" val="432334292"/>
+        <p14:creationId xmlns:p14="http://schemas.microsoft.com/office/powerpoint/2010/main" val="1805307016"/>
       </p:ext>
     </p:extLst>
   </p:cSld>
   <p:clrMapOvr>
     <a:masterClrMapping/>
   </p:clrMapOvr>
-  <p:timing>
-    <p:tnLst>
-      <p:par>
-        <p:cTn id="1" dur="indefinite" restart="never" nodeType="tmRoot"/>
-      </p:par>
-    </p:tnLst>
-  </p:timing>
+</p:sld>
+</file>
+
+<file path=ppt/slides/slide5.xml><?xml version="1.0" encoding="utf-8"?>
+<p:sld xmlns:a="http://schemas.openxmlformats.org/drawingml/2006/main" xmlns:r="http://schemas.openxmlformats.org/officeDocument/2006/relationships" xmlns:p="http://schemas.openxmlformats.org/presentationml/2006/main">
+  <p:cSld>
+    <p:spTree>
+      <p:nvGrpSpPr>
+        <p:cNvPr id="1" name=""/>
+        <p:cNvGrpSpPr/>
+        <p:nvPr/>
+      </p:nvGrpSpPr>
+      <p:grpSpPr>
+        <a:xfrm>
+          <a:off x="0" y="0"/>
+          <a:ext cx="0" cy="0"/>
+          <a:chOff x="0" y="0"/>
+          <a:chExt cx="0" cy="0"/>
+        </a:xfrm>
+      </p:grpSpPr>
+      <p:sp>
+        <p:nvSpPr>
+          <p:cNvPr id="2" name="Title 1"/>
+          <p:cNvSpPr>
+            <a:spLocks noGrp="1"/>
+          </p:cNvSpPr>
+          <p:nvPr>
+            <p:ph type="title"/>
+          </p:nvPr>
+        </p:nvSpPr>
+        <p:spPr/>
+        <p:txBody>
+          <a:bodyPr/>
+          <a:lstStyle/>
+          <a:p>
+            <a:r>
+              <a:rPr lang="en-US" dirty="0" smtClean="0"/>
+              <a:t>Individual Records </a:t>
+            </a:r>
+            <a:endParaRPr lang="en-US" dirty="0"/>
+          </a:p>
+        </p:txBody>
+      </p:sp>
+      <p:sp>
+        <p:nvSpPr>
+          <p:cNvPr id="3" name="Content Placeholder 2"/>
+          <p:cNvSpPr>
+            <a:spLocks noGrp="1"/>
+          </p:cNvSpPr>
+          <p:nvPr>
+            <p:ph idx="1"/>
+          </p:nvPr>
+        </p:nvSpPr>
+        <p:spPr/>
+        <p:txBody>
+          <a:bodyPr/>
+          <a:lstStyle/>
+          <a:p>
+            <a:r>
+              <a:rPr lang="en-US" dirty="0" smtClean="0"/>
+              <a:t>We analyzed a few different records we were given</a:t>
+            </a:r>
+          </a:p>
+          <a:p>
+            <a:pPr lvl="1"/>
+            <a:r>
+              <a:rPr lang="en-US" dirty="0" smtClean="0"/>
+              <a:t>Phone records </a:t>
+            </a:r>
+          </a:p>
+          <a:p>
+            <a:pPr lvl="1"/>
+            <a:r>
+              <a:rPr lang="en-US" dirty="0" smtClean="0"/>
+              <a:t>Travel history</a:t>
+            </a:r>
+          </a:p>
+          <a:p>
+            <a:pPr lvl="1"/>
+            <a:r>
+              <a:rPr lang="en-US" dirty="0" smtClean="0"/>
+              <a:t>Citizenship </a:t>
+            </a:r>
+          </a:p>
+          <a:p>
+            <a:pPr lvl="1"/>
+            <a:r>
+              <a:rPr lang="en-US" dirty="0" smtClean="0"/>
+              <a:t>Server access logs</a:t>
+            </a:r>
+          </a:p>
+          <a:p>
+            <a:pPr lvl="1"/>
+            <a:r>
+              <a:rPr lang="en-US" dirty="0" smtClean="0"/>
+              <a:t>Job History </a:t>
+            </a:r>
+            <a:endParaRPr lang="en-US" dirty="0"/>
+          </a:p>
+        </p:txBody>
+      </p:sp>
+    </p:spTree>
+    <p:extLst>
+      <p:ext uri="{BB962C8B-B14F-4D97-AF65-F5344CB8AC3E}">
+        <p14:creationId xmlns:p14="http://schemas.microsoft.com/office/powerpoint/2010/main" val="3926486592"/>
+      </p:ext>
+    </p:extLst>
+  </p:cSld>
+  <p:clrMapOvr>
+    <a:masterClrMapping/>
+  </p:clrMapOvr>
+</p:sld>
+</file>
+
+<file path=ppt/slides/slide6.xml><?xml version="1.0" encoding="utf-8"?>
+<p:sld xmlns:a="http://schemas.openxmlformats.org/drawingml/2006/main" xmlns:r="http://schemas.openxmlformats.org/officeDocument/2006/relationships" xmlns:p="http://schemas.openxmlformats.org/presentationml/2006/main">
+  <p:cSld>
+    <p:spTree>
+      <p:nvGrpSpPr>
+        <p:cNvPr id="1" name=""/>
+        <p:cNvGrpSpPr/>
+        <p:nvPr/>
+      </p:nvGrpSpPr>
+      <p:grpSpPr>
+        <a:xfrm>
+          <a:off x="0" y="0"/>
+          <a:ext cx="0" cy="0"/>
+          <a:chOff x="0" y="0"/>
+          <a:chExt cx="0" cy="0"/>
+        </a:xfrm>
+      </p:grpSpPr>
+      <p:sp>
+        <p:nvSpPr>
+          <p:cNvPr id="2" name="Title 1"/>
+          <p:cNvSpPr>
+            <a:spLocks noGrp="1"/>
+          </p:cNvSpPr>
+          <p:nvPr>
+            <p:ph type="title"/>
+          </p:nvPr>
+        </p:nvSpPr>
+        <p:spPr/>
+        <p:txBody>
+          <a:bodyPr/>
+          <a:lstStyle/>
+          <a:p>
+            <a:r>
+              <a:rPr lang="en-US" dirty="0" smtClean="0"/>
+              <a:t>Phone Records</a:t>
+            </a:r>
+            <a:br>
+              <a:rPr lang="en-US" dirty="0" smtClean="0"/>
+            </a:br>
+            <a:endParaRPr lang="en-US" dirty="0"/>
+          </a:p>
+        </p:txBody>
+      </p:sp>
+      <p:sp>
+        <p:nvSpPr>
+          <p:cNvPr id="3" name="Content Placeholder 2"/>
+          <p:cNvSpPr>
+            <a:spLocks noGrp="1"/>
+          </p:cNvSpPr>
+          <p:nvPr>
+            <p:ph idx="1"/>
+          </p:nvPr>
+        </p:nvSpPr>
+        <p:spPr/>
+        <p:txBody>
+          <a:bodyPr/>
+          <a:lstStyle/>
+          <a:p>
+            <a:r>
+              <a:rPr lang="en-US" dirty="0" smtClean="0"/>
+              <a:t>The level of threat for phone records was defined by two records</a:t>
+            </a:r>
+          </a:p>
+          <a:p>
+            <a:pPr lvl="1"/>
+            <a:r>
+              <a:rPr lang="en-US" dirty="0" smtClean="0"/>
+              <a:t>Was the number a unique number, and how long was the call</a:t>
+            </a:r>
+          </a:p>
+          <a:p>
+            <a:pPr lvl="1"/>
+            <a:r>
+              <a:rPr lang="en-US" dirty="0" smtClean="0"/>
+              <a:t>Where was the source of the call, and where was the destination </a:t>
+            </a:r>
+          </a:p>
+          <a:p>
+            <a:r>
+              <a:rPr lang="en-US" dirty="0" smtClean="0"/>
+              <a:t>Software Walkthrough</a:t>
+            </a:r>
+          </a:p>
+          <a:p>
+            <a:pPr lvl="1"/>
+            <a:r>
+              <a:rPr lang="en-US" dirty="0" smtClean="0"/>
+              <a:t>Checks for phone numbers occurring once</a:t>
+            </a:r>
+          </a:p>
+          <a:p>
+            <a:pPr lvl="1"/>
+            <a:r>
+              <a:rPr lang="en-US" dirty="0" smtClean="0"/>
+              <a:t>Checks the length of call</a:t>
+            </a:r>
+          </a:p>
+          <a:p>
+            <a:pPr lvl="1"/>
+            <a:r>
+              <a:rPr lang="en-US" dirty="0" smtClean="0"/>
+              <a:t>Assigns threat level based off source and destination </a:t>
+            </a:r>
+          </a:p>
+          <a:p>
+            <a:pPr lvl="1"/>
+            <a:r>
+              <a:rPr lang="en-US" dirty="0" smtClean="0"/>
+              <a:t>Returns arrays with employee names </a:t>
+            </a:r>
+          </a:p>
+          <a:p>
+            <a:pPr lvl="1"/>
+            <a:r>
+              <a:rPr lang="en-US" dirty="0" smtClean="0"/>
+              <a:t>Results are stored in the employee class</a:t>
+            </a:r>
+          </a:p>
+          <a:p>
+            <a:pPr lvl="1"/>
+            <a:endParaRPr lang="en-US" dirty="0"/>
+          </a:p>
+        </p:txBody>
+      </p:sp>
+    </p:spTree>
+    <p:extLst>
+      <p:ext uri="{BB962C8B-B14F-4D97-AF65-F5344CB8AC3E}">
+        <p14:creationId xmlns:p14="http://schemas.microsoft.com/office/powerpoint/2010/main" val="1176215862"/>
+      </p:ext>
+    </p:extLst>
+  </p:cSld>
+  <p:clrMapOvr>
+    <a:masterClrMapping/>
+  </p:clrMapOvr>
+</p:sld>
+</file>
+
+<file path=ppt/slides/slide7.xml><?xml version="1.0" encoding="utf-8"?>
+<p:sld xmlns:a="http://schemas.openxmlformats.org/drawingml/2006/main" xmlns:r="http://schemas.openxmlformats.org/officeDocument/2006/relationships" xmlns:p="http://schemas.openxmlformats.org/presentationml/2006/main">
+  <p:cSld>
+    <p:spTree>
+      <p:nvGrpSpPr>
+        <p:cNvPr id="1" name=""/>
+        <p:cNvGrpSpPr/>
+        <p:nvPr/>
+      </p:nvGrpSpPr>
+      <p:grpSpPr>
+        <a:xfrm>
+          <a:off x="0" y="0"/>
+          <a:ext cx="0" cy="0"/>
+          <a:chOff x="0" y="0"/>
+          <a:chExt cx="0" cy="0"/>
+        </a:xfrm>
+      </p:grpSpPr>
+      <p:sp>
+        <p:nvSpPr>
+          <p:cNvPr id="2" name="Title 1"/>
+          <p:cNvSpPr>
+            <a:spLocks noGrp="1"/>
+          </p:cNvSpPr>
+          <p:nvPr>
+            <p:ph type="title"/>
+          </p:nvPr>
+        </p:nvSpPr>
+        <p:spPr/>
+        <p:txBody>
+          <a:bodyPr/>
+          <a:lstStyle/>
+          <a:p>
+            <a:r>
+              <a:rPr lang="en-US" dirty="0" smtClean="0"/>
+              <a:t>Travel History</a:t>
+            </a:r>
+            <a:endParaRPr lang="en-US" dirty="0"/>
+          </a:p>
+        </p:txBody>
+      </p:sp>
+      <p:sp>
+        <p:nvSpPr>
+          <p:cNvPr id="3" name="Content Placeholder 2"/>
+          <p:cNvSpPr>
+            <a:spLocks noGrp="1"/>
+          </p:cNvSpPr>
+          <p:nvPr>
+            <p:ph idx="1"/>
+          </p:nvPr>
+        </p:nvSpPr>
+        <p:spPr/>
+        <p:txBody>
+          <a:bodyPr/>
+          <a:lstStyle/>
+          <a:p>
+            <a:r>
+              <a:rPr lang="en-US" dirty="0" smtClean="0"/>
+              <a:t>Threat level for air travel was defined by one record</a:t>
+            </a:r>
+          </a:p>
+          <a:p>
+            <a:pPr lvl="1"/>
+            <a:r>
+              <a:rPr lang="en-US" dirty="0" smtClean="0"/>
+              <a:t>How many flights the person booked in a single day</a:t>
+            </a:r>
+          </a:p>
+          <a:p>
+            <a:r>
+              <a:rPr lang="en-US" dirty="0" smtClean="0"/>
+              <a:t>Software Walkthrough </a:t>
+            </a:r>
+          </a:p>
+          <a:p>
+            <a:pPr lvl="1"/>
+            <a:r>
+              <a:rPr lang="en-US" dirty="0" smtClean="0"/>
+              <a:t>Import employee class to function</a:t>
+            </a:r>
+          </a:p>
+          <a:p>
+            <a:pPr lvl="1"/>
+            <a:r>
+              <a:rPr lang="en-US" dirty="0" smtClean="0"/>
+              <a:t>Checks the travel record for flights relating to employee name</a:t>
+            </a:r>
+          </a:p>
+          <a:p>
+            <a:pPr lvl="1"/>
+            <a:r>
+              <a:rPr lang="en-US" dirty="0" smtClean="0"/>
+              <a:t>If multiple booked on the same day, increase threat level</a:t>
+            </a:r>
+          </a:p>
+          <a:p>
+            <a:pPr lvl="1"/>
+            <a:r>
+              <a:rPr lang="en-US" dirty="0" smtClean="0"/>
+              <a:t>Returns a threat probability and saves it to the class</a:t>
+            </a:r>
+          </a:p>
+          <a:p>
+            <a:pPr lvl="1"/>
+            <a:endParaRPr lang="en-US" dirty="0" smtClean="0"/>
+          </a:p>
+        </p:txBody>
+      </p:sp>
+    </p:spTree>
+    <p:extLst>
+      <p:ext uri="{BB962C8B-B14F-4D97-AF65-F5344CB8AC3E}">
+        <p14:creationId xmlns:p14="http://schemas.microsoft.com/office/powerpoint/2010/main" val="800894778"/>
+      </p:ext>
+    </p:extLst>
+  </p:cSld>
+  <p:clrMapOvr>
+    <a:masterClrMapping/>
+  </p:clrMapOvr>
+</p:sld>
+</file>
+
+<file path=ppt/slides/slide8.xml><?xml version="1.0" encoding="utf-8"?>
+<p:sld xmlns:a="http://schemas.openxmlformats.org/drawingml/2006/main" xmlns:r="http://schemas.openxmlformats.org/officeDocument/2006/relationships" xmlns:p="http://schemas.openxmlformats.org/presentationml/2006/main">
+  <p:cSld>
+    <p:spTree>
+      <p:nvGrpSpPr>
+        <p:cNvPr id="1" name=""/>
+        <p:cNvGrpSpPr/>
+        <p:nvPr/>
+      </p:nvGrpSpPr>
+      <p:grpSpPr>
+        <a:xfrm>
+          <a:off x="0" y="0"/>
+          <a:ext cx="0" cy="0"/>
+          <a:chOff x="0" y="0"/>
+          <a:chExt cx="0" cy="0"/>
+        </a:xfrm>
+      </p:grpSpPr>
+      <p:sp>
+        <p:nvSpPr>
+          <p:cNvPr id="2" name="Title 1"/>
+          <p:cNvSpPr>
+            <a:spLocks noGrp="1"/>
+          </p:cNvSpPr>
+          <p:nvPr>
+            <p:ph type="title"/>
+          </p:nvPr>
+        </p:nvSpPr>
+        <p:spPr/>
+        <p:txBody>
+          <a:bodyPr/>
+          <a:lstStyle/>
+          <a:p>
+            <a:r>
+              <a:rPr lang="en-US" dirty="0" smtClean="0"/>
+              <a:t>Citizenship</a:t>
+            </a:r>
+            <a:endParaRPr lang="en-US" dirty="0"/>
+          </a:p>
+        </p:txBody>
+      </p:sp>
+      <p:sp>
+        <p:nvSpPr>
+          <p:cNvPr id="3" name="Content Placeholder 2"/>
+          <p:cNvSpPr>
+            <a:spLocks noGrp="1"/>
+          </p:cNvSpPr>
+          <p:nvPr>
+            <p:ph idx="1"/>
+          </p:nvPr>
+        </p:nvSpPr>
+        <p:spPr/>
+        <p:txBody>
+          <a:bodyPr/>
+          <a:lstStyle/>
+          <a:p>
+            <a:r>
+              <a:rPr lang="en-US" dirty="0" smtClean="0"/>
+              <a:t>The citizenship threat was defined by one record </a:t>
+            </a:r>
+          </a:p>
+          <a:p>
+            <a:pPr lvl="1"/>
+            <a:r>
+              <a:rPr lang="en-US" dirty="0" smtClean="0"/>
+              <a:t>Where was the person born </a:t>
+            </a:r>
+          </a:p>
+          <a:p>
+            <a:r>
+              <a:rPr lang="en-US" dirty="0" smtClean="0"/>
+              <a:t>Software Walkthrough</a:t>
+            </a:r>
+          </a:p>
+          <a:p>
+            <a:pPr lvl="1"/>
+            <a:r>
+              <a:rPr lang="en-US" dirty="0" smtClean="0"/>
+              <a:t>Import the employee class to get name of employee</a:t>
+            </a:r>
+          </a:p>
+          <a:p>
+            <a:pPr lvl="1"/>
+            <a:r>
+              <a:rPr lang="en-US" dirty="0" smtClean="0"/>
+              <a:t>Searches through citizenship tab to locate employee</a:t>
+            </a:r>
+          </a:p>
+          <a:p>
+            <a:pPr lvl="1"/>
+            <a:r>
+              <a:rPr lang="en-US" dirty="0" smtClean="0"/>
+              <a:t>Pulls from excel document the employee’s birth place</a:t>
+            </a:r>
+          </a:p>
+          <a:p>
+            <a:pPr lvl="1"/>
+            <a:r>
+              <a:rPr lang="en-US" dirty="0" smtClean="0"/>
+              <a:t>Assigns them a threat level based on their country of origin </a:t>
+            </a:r>
+            <a:endParaRPr lang="en-US" dirty="0"/>
+          </a:p>
+        </p:txBody>
+      </p:sp>
+    </p:spTree>
+    <p:extLst>
+      <p:ext uri="{BB962C8B-B14F-4D97-AF65-F5344CB8AC3E}">
+        <p14:creationId xmlns:p14="http://schemas.microsoft.com/office/powerpoint/2010/main" val="314310355"/>
+      </p:ext>
+    </p:extLst>
+  </p:cSld>
+  <p:clrMapOvr>
+    <a:masterClrMapping/>
+  </p:clrMapOvr>
+</p:sld>
+</file>
+
+<file path=ppt/slides/slide9.xml><?xml version="1.0" encoding="utf-8"?>
+<p:sld xmlns:a="http://schemas.openxmlformats.org/drawingml/2006/main" xmlns:r="http://schemas.openxmlformats.org/officeDocument/2006/relationships" xmlns:p="http://schemas.openxmlformats.org/presentationml/2006/main">
+  <p:cSld>
+    <p:spTree>
+      <p:nvGrpSpPr>
+        <p:cNvPr id="1" name=""/>
+        <p:cNvGrpSpPr/>
+        <p:nvPr/>
+      </p:nvGrpSpPr>
+      <p:grpSpPr>
+        <a:xfrm>
+          <a:off x="0" y="0"/>
+          <a:ext cx="0" cy="0"/>
+          <a:chOff x="0" y="0"/>
+          <a:chExt cx="0" cy="0"/>
+        </a:xfrm>
+      </p:grpSpPr>
+      <p:sp>
+        <p:nvSpPr>
+          <p:cNvPr id="2" name="Title 1"/>
+          <p:cNvSpPr>
+            <a:spLocks noGrp="1"/>
+          </p:cNvSpPr>
+          <p:nvPr>
+            <p:ph type="title"/>
+          </p:nvPr>
+        </p:nvSpPr>
+        <p:spPr/>
+        <p:txBody>
+          <a:bodyPr/>
+          <a:lstStyle/>
+          <a:p>
+            <a:r>
+              <a:rPr lang="en-US" dirty="0" smtClean="0"/>
+              <a:t>Server Access Log</a:t>
+            </a:r>
+            <a:endParaRPr lang="en-US" dirty="0"/>
+          </a:p>
+        </p:txBody>
+      </p:sp>
+      <p:sp>
+        <p:nvSpPr>
+          <p:cNvPr id="3" name="Content Placeholder 2"/>
+          <p:cNvSpPr>
+            <a:spLocks noGrp="1"/>
+          </p:cNvSpPr>
+          <p:nvPr>
+            <p:ph idx="1"/>
+          </p:nvPr>
+        </p:nvSpPr>
+        <p:spPr/>
+        <p:txBody>
+          <a:bodyPr/>
+          <a:lstStyle/>
+          <a:p>
+            <a:r>
+              <a:rPr lang="en-US" dirty="0" smtClean="0"/>
+              <a:t>The Server access threat was determined by one record</a:t>
+            </a:r>
+          </a:p>
+          <a:p>
+            <a:pPr lvl="1"/>
+            <a:r>
+              <a:rPr lang="en-US" dirty="0" smtClean="0"/>
+              <a:t>How many times in a calendar year someone accessed the server</a:t>
+            </a:r>
+          </a:p>
+          <a:p>
+            <a:r>
+              <a:rPr lang="en-US" dirty="0" smtClean="0"/>
+              <a:t>Software Walkthrough</a:t>
+            </a:r>
+          </a:p>
+          <a:p>
+            <a:pPr lvl="1"/>
+            <a:r>
+              <a:rPr lang="en-US" dirty="0" smtClean="0"/>
+              <a:t>Again using the employee class to get corresponding NTID to name</a:t>
+            </a:r>
+          </a:p>
+          <a:p>
+            <a:pPr lvl="1"/>
+            <a:r>
+              <a:rPr lang="en-US" dirty="0" smtClean="0"/>
+              <a:t>Search for each occurrence of the NTID and record it</a:t>
+            </a:r>
+          </a:p>
+          <a:p>
+            <a:pPr lvl="1"/>
+            <a:r>
+              <a:rPr lang="en-US" dirty="0" smtClean="0"/>
+              <a:t>Iterates until the NTID changes </a:t>
+            </a:r>
+          </a:p>
+          <a:p>
+            <a:pPr lvl="1"/>
+            <a:r>
+              <a:rPr lang="en-US" dirty="0" smtClean="0"/>
+              <a:t>Records the amount of times employee accessed and assigns threat level</a:t>
+            </a:r>
+          </a:p>
+          <a:p>
+            <a:pPr lvl="1"/>
+            <a:r>
+              <a:rPr lang="en-US" dirty="0" smtClean="0"/>
+              <a:t>Returns the threat and saves it to the class</a:t>
+            </a:r>
+            <a:endParaRPr lang="en-US" dirty="0"/>
+          </a:p>
+        </p:txBody>
+      </p:sp>
+    </p:spTree>
+    <p:extLst>
+      <p:ext uri="{BB962C8B-B14F-4D97-AF65-F5344CB8AC3E}">
+        <p14:creationId xmlns:p14="http://schemas.microsoft.com/office/powerpoint/2010/main" val="982676769"/>
+      </p:ext>
+    </p:extLst>
+  </p:cSld>
+  <p:clrMapOvr>
+    <a:masterClrMapping/>
+  </p:clrMapOvr>
 </p:sld>
 </file>
 
@@ -8119,7 +8986,7 @@
     </a:clrScheme>
     <a:fontScheme name="Wisp">
       <a:majorFont>
-        <a:latin typeface="Century Gothic" panose="020B0502020202020204"/>
+        <a:latin typeface="Century Gothic"/>
         <a:ea typeface=""/>
         <a:cs typeface=""/>
         <a:font script="Jpan" typeface="メイリオ"/>
@@ -8154,7 +9021,7 @@
         <a:font script="Geor" typeface="Sylfaen"/>
       </a:majorFont>
       <a:minorFont>
-        <a:latin typeface="Century Gothic" panose="020B0502020202020204"/>
+        <a:latin typeface="Century Gothic"/>
         <a:ea typeface=""/>
         <a:cs typeface=""/>
         <a:font script="Jpan" typeface="メイリオ"/>
@@ -8313,7 +9180,7 @@
   <a:extraClrSchemeLst/>
   <a:extLst>
     <a:ext uri="{05A4C25C-085E-4340-85A3-A5531E510DB2}">
-      <thm15:themeFamily xmlns:thm15="http://schemas.microsoft.com/office/thememl/2012/main" name="Wisp" id="{7CB32D59-10C0-40DD-B7BD-2E94284A981C}" vid="{24B1A44C-C006-48B2-A4D7-E5549B3D8CD4}"/>
+      <thm15:themeFamily xmlns:thm15="http://schemas.microsoft.com/office/thememl/2012/main" xmlns="" name="Wisp" id="{7CB32D59-10C0-40DD-B7BD-2E94284A981C}" vid="{24B1A44C-C006-48B2-A4D7-E5549B3D8CD4}"/>
     </a:ext>
   </a:extLst>
 </a:theme>

</xml_diff>

<commit_message>
Some spelling changes and rewording
</commit_message>
<xml_diff>
--- a/Data Analytics Challenge Final PowerPoint.pptx
+++ b/Data Analytics Challenge Final PowerPoint.pptx
@@ -117,7 +117,7 @@
   </p:defaultTextStyle>
   <p:extLst>
     <p:ext uri="{EFAFB233-063F-42B5-8137-9DF3F51BA10A}">
-      <p15:sldGuideLst xmlns:p15="http://schemas.microsoft.com/office/powerpoint/2012/main">
+      <p15:sldGuideLst xmlns:p15="http://schemas.microsoft.com/office/powerpoint/2012/main" xmlns="">
         <p15:guide id="1" orient="horz" pos="2160">
           <p15:clr>
             <a:srgbClr val="A4A3A4"/>
@@ -322,7 +322,7 @@
           <a:p>
             <a:fld id="{7F872B37-9ECC-448D-B8DA-4D5FD120384B}" type="datetimeFigureOut">
               <a:rPr lang="en-US" smtClean="0"/>
-              <a:t>12/4/2014</a:t>
+              <a:t>12/4/14</a:t>
             </a:fld>
             <a:endParaRPr lang="en-US"/>
           </a:p>
@@ -660,7 +660,7 @@
           <a:p>
             <a:fld id="{7F872B37-9ECC-448D-B8DA-4D5FD120384B}" type="datetimeFigureOut">
               <a:rPr lang="en-US" smtClean="0"/>
-              <a:t>12/4/2014</a:t>
+              <a:t>12/4/14</a:t>
             </a:fld>
             <a:endParaRPr lang="en-US"/>
           </a:p>
@@ -1061,7 +1061,7 @@
           <a:p>
             <a:fld id="{7F872B37-9ECC-448D-B8DA-4D5FD120384B}" type="datetimeFigureOut">
               <a:rPr lang="en-US" smtClean="0"/>
-              <a:t>12/4/2014</a:t>
+              <a:t>12/4/14</a:t>
             </a:fld>
             <a:endParaRPr lang="en-US"/>
           </a:p>
@@ -1397,7 +1397,7 @@
           <a:p>
             <a:fld id="{7F872B37-9ECC-448D-B8DA-4D5FD120384B}" type="datetimeFigureOut">
               <a:rPr lang="en-US" smtClean="0"/>
-              <a:t>12/4/2014</a:t>
+              <a:t>12/4/14</a:t>
             </a:fld>
             <a:endParaRPr lang="en-US"/>
           </a:p>
@@ -1717,7 +1717,7 @@
           <a:p>
             <a:fld id="{7F872B37-9ECC-448D-B8DA-4D5FD120384B}" type="datetimeFigureOut">
               <a:rPr lang="en-US" smtClean="0"/>
-              <a:t>12/4/2014</a:t>
+              <a:t>12/4/14</a:t>
             </a:fld>
             <a:endParaRPr lang="en-US"/>
           </a:p>
@@ -2113,7 +2113,7 @@
           <a:p>
             <a:fld id="{7F872B37-9ECC-448D-B8DA-4D5FD120384B}" type="datetimeFigureOut">
               <a:rPr lang="en-US" smtClean="0"/>
-              <a:t>12/4/2014</a:t>
+              <a:t>12/4/14</a:t>
             </a:fld>
             <a:endParaRPr lang="en-US"/>
           </a:p>
@@ -2370,7 +2370,7 @@
           <a:p>
             <a:fld id="{7F872B37-9ECC-448D-B8DA-4D5FD120384B}" type="datetimeFigureOut">
               <a:rPr lang="en-US" smtClean="0"/>
-              <a:t>12/4/2014</a:t>
+              <a:t>12/4/14</a:t>
             </a:fld>
             <a:endParaRPr lang="en-US"/>
           </a:p>
@@ -2632,7 +2632,7 @@
           <a:p>
             <a:fld id="{7F872B37-9ECC-448D-B8DA-4D5FD120384B}" type="datetimeFigureOut">
               <a:rPr lang="en-US" smtClean="0"/>
-              <a:t>12/4/2014</a:t>
+              <a:t>12/4/14</a:t>
             </a:fld>
             <a:endParaRPr lang="en-US"/>
           </a:p>
@@ -2894,7 +2894,7 @@
           <a:p>
             <a:fld id="{7F872B37-9ECC-448D-B8DA-4D5FD120384B}" type="datetimeFigureOut">
               <a:rPr lang="en-US" smtClean="0"/>
-              <a:t>12/4/2014</a:t>
+              <a:t>12/4/14</a:t>
             </a:fld>
             <a:endParaRPr lang="en-US"/>
           </a:p>
@@ -3223,7 +3223,7 @@
           <a:p>
             <a:fld id="{7F872B37-9ECC-448D-B8DA-4D5FD120384B}" type="datetimeFigureOut">
               <a:rPr lang="en-US" smtClean="0"/>
-              <a:t>12/4/2014</a:t>
+              <a:t>12/4/14</a:t>
             </a:fld>
             <a:endParaRPr lang="en-US"/>
           </a:p>
@@ -3546,7 +3546,7 @@
           <a:p>
             <a:fld id="{7F872B37-9ECC-448D-B8DA-4D5FD120384B}" type="datetimeFigureOut">
               <a:rPr lang="en-US" smtClean="0"/>
-              <a:t>12/4/2014</a:t>
+              <a:t>12/4/14</a:t>
             </a:fld>
             <a:endParaRPr lang="en-US"/>
           </a:p>
@@ -4003,7 +4003,7 @@
           <a:p>
             <a:fld id="{7F872B37-9ECC-448D-B8DA-4D5FD120384B}" type="datetimeFigureOut">
               <a:rPr lang="en-US" smtClean="0"/>
-              <a:t>12/4/2014</a:t>
+              <a:t>12/4/14</a:t>
             </a:fld>
             <a:endParaRPr lang="en-US"/>
           </a:p>
@@ -4208,7 +4208,7 @@
           <a:p>
             <a:fld id="{7F872B37-9ECC-448D-B8DA-4D5FD120384B}" type="datetimeFigureOut">
               <a:rPr lang="en-US" smtClean="0"/>
-              <a:t>12/4/2014</a:t>
+              <a:t>12/4/14</a:t>
             </a:fld>
             <a:endParaRPr lang="en-US"/>
           </a:p>
@@ -4385,7 +4385,7 @@
           <a:p>
             <a:fld id="{7F872B37-9ECC-448D-B8DA-4D5FD120384B}" type="datetimeFigureOut">
               <a:rPr lang="en-US" smtClean="0"/>
-              <a:t>12/4/2014</a:t>
+              <a:t>12/4/14</a:t>
             </a:fld>
             <a:endParaRPr lang="en-US"/>
           </a:p>
@@ -4718,7 +4718,7 @@
           <a:p>
             <a:fld id="{7F872B37-9ECC-448D-B8DA-4D5FD120384B}" type="datetimeFigureOut">
               <a:rPr lang="en-US" smtClean="0"/>
-              <a:t>12/4/2014</a:t>
+              <a:t>12/4/14</a:t>
             </a:fld>
             <a:endParaRPr lang="en-US"/>
           </a:p>
@@ -5063,7 +5063,7 @@
           <a:p>
             <a:fld id="{7F872B37-9ECC-448D-B8DA-4D5FD120384B}" type="datetimeFigureOut">
               <a:rPr lang="en-US" smtClean="0"/>
-              <a:t>12/4/2014</a:t>
+              <a:t>12/4/14</a:t>
             </a:fld>
             <a:endParaRPr lang="en-US"/>
           </a:p>
@@ -7180,7 +7180,7 @@
           <a:p>
             <a:fld id="{7F872B37-9ECC-448D-B8DA-4D5FD120384B}" type="datetimeFigureOut">
               <a:rPr lang="en-US" smtClean="0"/>
-              <a:t>12/4/2014</a:t>
+              <a:t>12/4/14</a:t>
             </a:fld>
             <a:endParaRPr lang="en-US"/>
           </a:p>
@@ -7780,7 +7780,7 @@
   <p:timing>
     <p:tnLst>
       <p:par>
-        <p:cTn id="1" dur="indefinite" restart="never" nodeType="tmRoot"/>
+        <p:cTn xmlns:p14="http://schemas.microsoft.com/office/powerpoint/2010/main" id="1" dur="indefinite" restart="never" nodeType="tmRoot"/>
       </p:par>
     </p:tnLst>
   </p:timing>
@@ -8039,7 +8039,7 @@
   <p:timing>
     <p:tnLst>
       <p:par>
-        <p:cTn id="1" dur="indefinite" restart="never" nodeType="tmRoot"/>
+        <p:cTn xmlns:p14="http://schemas.microsoft.com/office/powerpoint/2010/main" id="1" dur="indefinite" restart="never" nodeType="tmRoot"/>
       </p:par>
     </p:tnLst>
   </p:timing>
@@ -8171,7 +8171,7 @@
   <p:timing>
     <p:tnLst>
       <p:par>
-        <p:cTn id="1" dur="indefinite" restart="never" nodeType="tmRoot"/>
+        <p:cTn xmlns:p14="http://schemas.microsoft.com/office/powerpoint/2010/main" id="1" dur="indefinite" restart="never" nodeType="tmRoot"/>
       </p:par>
     </p:tnLst>
   </p:timing>
@@ -8288,7 +8288,7 @@
   <p:timing>
     <p:tnLst>
       <p:par>
-        <p:cTn id="1" dur="indefinite" restart="never" nodeType="tmRoot"/>
+        <p:cTn xmlns:p14="http://schemas.microsoft.com/office/powerpoint/2010/main" id="1" dur="indefinite" restart="never" nodeType="tmRoot"/>
       </p:par>
     </p:tnLst>
   </p:timing>
@@ -8391,7 +8391,7 @@
   <p:timing>
     <p:tnLst>
       <p:par>
-        <p:cTn id="1" dur="indefinite" restart="never" nodeType="tmRoot"/>
+        <p:cTn xmlns:p14="http://schemas.microsoft.com/office/powerpoint/2010/main" id="1" dur="indefinite" restart="never" nodeType="tmRoot"/>
       </p:par>
     </p:tnLst>
   </p:timing>
@@ -8463,7 +8463,15 @@
           <a:p>
             <a:r>
               <a:rPr lang="en-US" sz="2000" dirty="0" smtClean="0"/>
-              <a:t>On the basic information page we gather or searching criteria</a:t>
+              <a:t>On the basic information page we gather </a:t>
+            </a:r>
+            <a:r>
+              <a:rPr lang="en-US" sz="2000" dirty="0" smtClean="0"/>
+              <a:t>our </a:t>
+            </a:r>
+            <a:r>
+              <a:rPr lang="en-US" sz="2000" dirty="0" smtClean="0"/>
+              <a:t>searching criteria</a:t>
             </a:r>
           </a:p>
           <a:p>
@@ -8487,15 +8495,31 @@
           <a:p>
             <a:r>
               <a:rPr lang="en-US" sz="2000" dirty="0" smtClean="0"/>
-              <a:t>After we have iterating through the document we write the output to a .</a:t>
+              <a:t>After we have </a:t>
+            </a:r>
+            <a:r>
+              <a:rPr lang="en-US" sz="2000" dirty="0" smtClean="0"/>
+              <a:t>iterated </a:t>
+            </a:r>
+            <a:r>
+              <a:rPr lang="en-US" sz="2000" dirty="0" smtClean="0"/>
+              <a:t>through the </a:t>
+            </a:r>
+            <a:r>
+              <a:rPr lang="en-US" sz="2000" dirty="0" smtClean="0"/>
+              <a:t>entire list of employees and assigned a threat level,</a:t>
+            </a:r>
+            <a:r>
+              <a:rPr lang="en-US" sz="2000" dirty="0" smtClean="0"/>
+              <a:t> </a:t>
+            </a:r>
+            <a:r>
+              <a:rPr lang="en-US" sz="2000" dirty="0" smtClean="0"/>
+              <a:t>we write the output to a .</a:t>
             </a:r>
             <a:r>
               <a:rPr lang="en-US" sz="2000" dirty="0" err="1" smtClean="0"/>
               <a:t>csv</a:t>
-            </a:r>
-            <a:r>
-              <a:rPr lang="en-US" sz="2000" dirty="0" smtClean="0"/>
-              <a:t>  </a:t>
             </a:r>
             <a:endParaRPr lang="en-US" sz="2000" dirty="0"/>
           </a:p>
@@ -8514,7 +8538,7 @@
   <p:timing>
     <p:tnLst>
       <p:par>
-        <p:cTn id="1" dur="indefinite" restart="never" nodeType="tmRoot"/>
+        <p:cTn xmlns:p14="http://schemas.microsoft.com/office/powerpoint/2010/main" id="1" dur="indefinite" restart="never" nodeType="tmRoot"/>
       </p:par>
     </p:tnLst>
   </p:timing>
@@ -8540,13 +8564,11 @@
       </p:grpSpPr>
       <p:pic>
         <p:nvPicPr>
-          <p:cNvPr id="4" name="Content Placeholder 3"/>
+          <p:cNvPr id="6" name="Picture 5" descr="functions.jpg"/>
           <p:cNvPicPr>
-            <a:picLocks noGrp="1" noChangeAspect="1"/>
+            <a:picLocks noChangeAspect="1"/>
           </p:cNvPicPr>
-          <p:nvPr>
-            <p:ph idx="1"/>
-          </p:nvPr>
+          <p:nvPr/>
         </p:nvPicPr>
         <p:blipFill>
           <a:blip r:embed="rId2">
@@ -8562,9 +8584,12 @@
         </p:blipFill>
         <p:spPr>
           <a:xfrm>
-            <a:off x="1795846" y="392290"/>
-            <a:ext cx="9166203" cy="5795492"/>
+            <a:off x="2029377" y="554182"/>
+            <a:ext cx="9758531" cy="6170002"/>
           </a:xfrm>
+          <a:prstGeom prst="rect">
+            <a:avLst/>
+          </a:prstGeom>
         </p:spPr>
       </p:pic>
     </p:spTree>
@@ -8580,7 +8605,7 @@
   <p:timing>
     <p:tnLst>
       <p:par>
-        <p:cTn id="1" dur="indefinite" restart="never" nodeType="tmRoot"/>
+        <p:cTn xmlns:p14="http://schemas.microsoft.com/office/powerpoint/2010/main" id="1" dur="indefinite" restart="never" nodeType="tmRoot"/>
       </p:par>
     </p:tnLst>
   </p:timing>
@@ -9315,7 +9340,7 @@
   <a:extraClrSchemeLst/>
   <a:extLst>
     <a:ext uri="{05A4C25C-085E-4340-85A3-A5531E510DB2}">
-      <thm15:themeFamily xmlns:thm15="http://schemas.microsoft.com/office/thememl/2012/main" name="Wisp" id="{7CB32D59-10C0-40DD-B7BD-2E94284A981C}" vid="{24B1A44C-C006-48B2-A4D7-E5549B3D8CD4}"/>
+      <thm15:themeFamily xmlns:thm15="http://schemas.microsoft.com/office/thememl/2012/main" xmlns="" name="Wisp" id="{7CB32D59-10C0-40DD-B7BD-2E94284A981C}" vid="{24B1A44C-C006-48B2-A4D7-E5549B3D8CD4}"/>
     </a:ext>
   </a:extLst>
 </a:theme>

</xml_diff>

<commit_message>
Latest version of powerpoint and an older version just in case we need something from it
</commit_message>
<xml_diff>
--- a/Data Analytics Challenge Final PowerPoint.pptx
+++ b/Data Analytics Challenge Final PowerPoint.pptx
@@ -8,14 +8,14 @@
     <p:sldId id="256" r:id="rId2"/>
     <p:sldId id="257" r:id="rId3"/>
     <p:sldId id="259" r:id="rId4"/>
-    <p:sldId id="266" r:id="rId5"/>
-    <p:sldId id="267" r:id="rId6"/>
+    <p:sldId id="261" r:id="rId5"/>
+    <p:sldId id="262" r:id="rId6"/>
     <p:sldId id="260" r:id="rId7"/>
-    <p:sldId id="261" r:id="rId8"/>
-    <p:sldId id="262" r:id="rId9"/>
-    <p:sldId id="263" r:id="rId10"/>
-    <p:sldId id="264" r:id="rId11"/>
-    <p:sldId id="265" r:id="rId12"/>
+    <p:sldId id="263" r:id="rId8"/>
+    <p:sldId id="264" r:id="rId9"/>
+    <p:sldId id="265" r:id="rId10"/>
+    <p:sldId id="266" r:id="rId11"/>
+    <p:sldId id="267" r:id="rId12"/>
     <p:sldId id="258" r:id="rId13"/>
   </p:sldIdLst>
   <p:sldSz cx="12192000" cy="6858000"/>
@@ -117,18 +117,7 @@
   </p:defaultTextStyle>
   <p:extLst>
     <p:ext uri="{EFAFB233-063F-42B5-8137-9DF3F51BA10A}">
-      <p15:sldGuideLst xmlns:p15="http://schemas.microsoft.com/office/powerpoint/2012/main" xmlns="">
-        <p15:guide id="1" orient="horz" pos="2160">
-          <p15:clr>
-            <a:srgbClr val="A4A3A4"/>
-          </p15:clr>
-        </p15:guide>
-        <p15:guide id="2" pos="3840">
-          <p15:clr>
-            <a:srgbClr val="A4A3A4"/>
-          </p15:clr>
-        </p15:guide>
-      </p15:sldGuideLst>
+      <p15:sldGuideLst xmlns:p15="http://schemas.microsoft.com/office/powerpoint/2012/main" xmlns=""/>
     </p:ext>
   </p:extLst>
 </p:presentation>
@@ -322,7 +311,7 @@
           <a:p>
             <a:fld id="{7F872B37-9ECC-448D-B8DA-4D5FD120384B}" type="datetimeFigureOut">
               <a:rPr lang="en-US" smtClean="0"/>
-              <a:t>12/4/14</a:t>
+              <a:t>12/7/14</a:t>
             </a:fld>
             <a:endParaRPr lang="en-US"/>
           </a:p>
@@ -660,7 +649,7 @@
           <a:p>
             <a:fld id="{7F872B37-9ECC-448D-B8DA-4D5FD120384B}" type="datetimeFigureOut">
               <a:rPr lang="en-US" smtClean="0"/>
-              <a:t>12/4/14</a:t>
+              <a:t>12/7/14</a:t>
             </a:fld>
             <a:endParaRPr lang="en-US"/>
           </a:p>
@@ -1061,7 +1050,7 @@
           <a:p>
             <a:fld id="{7F872B37-9ECC-448D-B8DA-4D5FD120384B}" type="datetimeFigureOut">
               <a:rPr lang="en-US" smtClean="0"/>
-              <a:t>12/4/14</a:t>
+              <a:t>12/7/14</a:t>
             </a:fld>
             <a:endParaRPr lang="en-US"/>
           </a:p>
@@ -1397,7 +1386,7 @@
           <a:p>
             <a:fld id="{7F872B37-9ECC-448D-B8DA-4D5FD120384B}" type="datetimeFigureOut">
               <a:rPr lang="en-US" smtClean="0"/>
-              <a:t>12/4/14</a:t>
+              <a:t>12/7/14</a:t>
             </a:fld>
             <a:endParaRPr lang="en-US"/>
           </a:p>
@@ -1717,7 +1706,7 @@
           <a:p>
             <a:fld id="{7F872B37-9ECC-448D-B8DA-4D5FD120384B}" type="datetimeFigureOut">
               <a:rPr lang="en-US" smtClean="0"/>
-              <a:t>12/4/14</a:t>
+              <a:t>12/7/14</a:t>
             </a:fld>
             <a:endParaRPr lang="en-US"/>
           </a:p>
@@ -2113,7 +2102,7 @@
           <a:p>
             <a:fld id="{7F872B37-9ECC-448D-B8DA-4D5FD120384B}" type="datetimeFigureOut">
               <a:rPr lang="en-US" smtClean="0"/>
-              <a:t>12/4/14</a:t>
+              <a:t>12/7/14</a:t>
             </a:fld>
             <a:endParaRPr lang="en-US"/>
           </a:p>
@@ -2370,7 +2359,7 @@
           <a:p>
             <a:fld id="{7F872B37-9ECC-448D-B8DA-4D5FD120384B}" type="datetimeFigureOut">
               <a:rPr lang="en-US" smtClean="0"/>
-              <a:t>12/4/14</a:t>
+              <a:t>12/7/14</a:t>
             </a:fld>
             <a:endParaRPr lang="en-US"/>
           </a:p>
@@ -2632,7 +2621,7 @@
           <a:p>
             <a:fld id="{7F872B37-9ECC-448D-B8DA-4D5FD120384B}" type="datetimeFigureOut">
               <a:rPr lang="en-US" smtClean="0"/>
-              <a:t>12/4/14</a:t>
+              <a:t>12/7/14</a:t>
             </a:fld>
             <a:endParaRPr lang="en-US"/>
           </a:p>
@@ -2894,7 +2883,7 @@
           <a:p>
             <a:fld id="{7F872B37-9ECC-448D-B8DA-4D5FD120384B}" type="datetimeFigureOut">
               <a:rPr lang="en-US" smtClean="0"/>
-              <a:t>12/4/14</a:t>
+              <a:t>12/7/14</a:t>
             </a:fld>
             <a:endParaRPr lang="en-US"/>
           </a:p>
@@ -3223,7 +3212,7 @@
           <a:p>
             <a:fld id="{7F872B37-9ECC-448D-B8DA-4D5FD120384B}" type="datetimeFigureOut">
               <a:rPr lang="en-US" smtClean="0"/>
-              <a:t>12/4/14</a:t>
+              <a:t>12/7/14</a:t>
             </a:fld>
             <a:endParaRPr lang="en-US"/>
           </a:p>
@@ -3546,7 +3535,7 @@
           <a:p>
             <a:fld id="{7F872B37-9ECC-448D-B8DA-4D5FD120384B}" type="datetimeFigureOut">
               <a:rPr lang="en-US" smtClean="0"/>
-              <a:t>12/4/14</a:t>
+              <a:t>12/7/14</a:t>
             </a:fld>
             <a:endParaRPr lang="en-US"/>
           </a:p>
@@ -4003,7 +3992,7 @@
           <a:p>
             <a:fld id="{7F872B37-9ECC-448D-B8DA-4D5FD120384B}" type="datetimeFigureOut">
               <a:rPr lang="en-US" smtClean="0"/>
-              <a:t>12/4/14</a:t>
+              <a:t>12/7/14</a:t>
             </a:fld>
             <a:endParaRPr lang="en-US"/>
           </a:p>
@@ -4208,7 +4197,7 @@
           <a:p>
             <a:fld id="{7F872B37-9ECC-448D-B8DA-4D5FD120384B}" type="datetimeFigureOut">
               <a:rPr lang="en-US" smtClean="0"/>
-              <a:t>12/4/14</a:t>
+              <a:t>12/7/14</a:t>
             </a:fld>
             <a:endParaRPr lang="en-US"/>
           </a:p>
@@ -4385,7 +4374,7 @@
           <a:p>
             <a:fld id="{7F872B37-9ECC-448D-B8DA-4D5FD120384B}" type="datetimeFigureOut">
               <a:rPr lang="en-US" smtClean="0"/>
-              <a:t>12/4/14</a:t>
+              <a:t>12/7/14</a:t>
             </a:fld>
             <a:endParaRPr lang="en-US"/>
           </a:p>
@@ -4718,7 +4707,7 @@
           <a:p>
             <a:fld id="{7F872B37-9ECC-448D-B8DA-4D5FD120384B}" type="datetimeFigureOut">
               <a:rPr lang="en-US" smtClean="0"/>
-              <a:t>12/4/14</a:t>
+              <a:t>12/7/14</a:t>
             </a:fld>
             <a:endParaRPr lang="en-US"/>
           </a:p>
@@ -5063,7 +5052,7 @@
           <a:p>
             <a:fld id="{7F872B37-9ECC-448D-B8DA-4D5FD120384B}" type="datetimeFigureOut">
               <a:rPr lang="en-US" smtClean="0"/>
-              <a:t>12/4/14</a:t>
+              <a:t>12/7/14</a:t>
             </a:fld>
             <a:endParaRPr lang="en-US"/>
           </a:p>
@@ -7180,7 +7169,7 @@
           <a:p>
             <a:fld id="{7F872B37-9ECC-448D-B8DA-4D5FD120384B}" type="datetimeFigureOut">
               <a:rPr lang="en-US" smtClean="0"/>
-              <a:t>12/4/14</a:t>
+              <a:t>12/7/14</a:t>
             </a:fld>
             <a:endParaRPr lang="en-US"/>
           </a:p>
@@ -7820,90 +7809,51 @@
           <a:lstStyle/>
           <a:p>
             <a:r>
+              <a:rPr lang="en-US" dirty="0"/>
+              <a:t>Threat Level: </a:t>
+            </a:r>
+            <a:r>
               <a:rPr lang="en-US" dirty="0" smtClean="0"/>
-              <a:t>Server Access Log</a:t>
+              <a:t>Job History</a:t>
             </a:r>
             <a:endParaRPr lang="en-US" dirty="0"/>
           </a:p>
         </p:txBody>
       </p:sp>
-      <p:sp>
-        <p:nvSpPr>
-          <p:cNvPr id="3" name="Content Placeholder 2"/>
-          <p:cNvSpPr>
-            <a:spLocks noGrp="1"/>
-          </p:cNvSpPr>
-          <p:nvPr>
-            <p:ph idx="1"/>
-          </p:nvPr>
-        </p:nvSpPr>
-        <p:spPr/>
-        <p:txBody>
-          <a:bodyPr>
-            <a:noAutofit/>
-          </a:bodyPr>
-          <a:lstStyle/>
-          <a:p>
-            <a:r>
-              <a:rPr lang="en-US" dirty="0" smtClean="0"/>
-              <a:t>The Server access threat was determined by one record</a:t>
-            </a:r>
-          </a:p>
-          <a:p>
-            <a:pPr lvl="1"/>
-            <a:r>
-              <a:rPr lang="en-US" sz="1800" dirty="0" smtClean="0"/>
-              <a:t>How many times in a calendar year someone accessed the server</a:t>
-            </a:r>
-          </a:p>
-          <a:p>
-            <a:r>
-              <a:rPr lang="en-US" dirty="0" smtClean="0"/>
-              <a:t>Software Walkthrough</a:t>
-            </a:r>
-          </a:p>
-          <a:p>
-            <a:pPr lvl="1"/>
-            <a:r>
-              <a:rPr lang="en-US" sz="1800" dirty="0" smtClean="0"/>
-              <a:t>Again using the employee class to get corresponding NTID to name</a:t>
-            </a:r>
-          </a:p>
-          <a:p>
-            <a:pPr lvl="1"/>
-            <a:r>
-              <a:rPr lang="en-US" sz="1800" dirty="0" smtClean="0"/>
-              <a:t>Search for each occurrence of the NTID and record it</a:t>
-            </a:r>
-          </a:p>
-          <a:p>
-            <a:pPr lvl="1"/>
-            <a:r>
-              <a:rPr lang="en-US" sz="1800" dirty="0" smtClean="0"/>
-              <a:t>Iterates until the NTID changes </a:t>
-            </a:r>
-          </a:p>
-          <a:p>
-            <a:pPr lvl="1"/>
-            <a:r>
-              <a:rPr lang="en-US" sz="1800" dirty="0" smtClean="0"/>
-              <a:t>Records the amount of times employee accessed and assigns threat level</a:t>
-            </a:r>
-          </a:p>
-          <a:p>
-            <a:pPr lvl="1"/>
-            <a:r>
-              <a:rPr lang="en-US" sz="1800" dirty="0" smtClean="0"/>
-              <a:t>Returns the threat and saves it to the class</a:t>
-            </a:r>
-            <a:endParaRPr lang="en-US" sz="1800" dirty="0"/>
-          </a:p>
-        </p:txBody>
-      </p:sp>
+      <p:pic>
+        <p:nvPicPr>
+          <p:cNvPr id="4" name="Picture 3" descr="job_history_log_flow.jpg"/>
+          <p:cNvPicPr>
+            <a:picLocks/>
+          </p:cNvPicPr>
+          <p:nvPr/>
+        </p:nvPicPr>
+        <p:blipFill>
+          <a:blip r:embed="rId2">
+            <a:extLst>
+              <a:ext uri="{28A0092B-C50C-407E-A947-70E740481C1C}">
+                <a14:useLocalDpi xmlns:a14="http://schemas.microsoft.com/office/drawing/2010/main" val="0"/>
+              </a:ext>
+            </a:extLst>
+          </a:blip>
+          <a:stretch>
+            <a:fillRect/>
+          </a:stretch>
+        </p:blipFill>
+        <p:spPr>
+          <a:xfrm>
+            <a:off x="2209510" y="1353312"/>
+            <a:ext cx="7772981" cy="5504688"/>
+          </a:xfrm>
+          <a:prstGeom prst="rect">
+            <a:avLst/>
+          </a:prstGeom>
+        </p:spPr>
+      </p:pic>
     </p:spTree>
     <p:extLst>
       <p:ext uri="{BB962C8B-B14F-4D97-AF65-F5344CB8AC3E}">
-        <p14:creationId xmlns:p14="http://schemas.microsoft.com/office/powerpoint/2010/main" val="982676769"/>
+        <p14:creationId xmlns:p14="http://schemas.microsoft.com/office/powerpoint/2010/main" val="3414107751"/>
       </p:ext>
     </p:extLst>
   </p:cSld>
@@ -7946,103 +7896,57 @@
           <a:lstStyle/>
           <a:p>
             <a:r>
+              <a:rPr lang="en-US" dirty="0"/>
+              <a:t>Threat Level: </a:t>
+            </a:r>
+            <a:r>
               <a:rPr lang="en-US" dirty="0" smtClean="0"/>
-              <a:t>Job History</a:t>
+              <a:t>Citizenship</a:t>
             </a:r>
             <a:endParaRPr lang="en-US" dirty="0"/>
           </a:p>
         </p:txBody>
       </p:sp>
-      <p:sp>
-        <p:nvSpPr>
-          <p:cNvPr id="3" name="Content Placeholder 2"/>
-          <p:cNvSpPr>
-            <a:spLocks noGrp="1"/>
-          </p:cNvSpPr>
-          <p:nvPr>
-            <p:ph idx="1"/>
-          </p:nvPr>
-        </p:nvSpPr>
-        <p:spPr/>
-        <p:txBody>
-          <a:bodyPr>
-            <a:normAutofit/>
-          </a:bodyPr>
-          <a:lstStyle/>
-          <a:p>
-            <a:r>
-              <a:rPr lang="en-US" sz="2000" dirty="0" smtClean="0"/>
-              <a:t>The job history threat determined by one record </a:t>
-            </a:r>
-          </a:p>
-          <a:p>
-            <a:pPr lvl="1"/>
-            <a:r>
-              <a:rPr lang="en-US" sz="2000" dirty="0" smtClean="0"/>
-              <a:t>How have their performance reviews been</a:t>
-            </a:r>
-          </a:p>
-          <a:p>
-            <a:r>
-              <a:rPr lang="en-US" sz="2000" dirty="0" smtClean="0"/>
-              <a:t>Software walkthrough </a:t>
-            </a:r>
-          </a:p>
-          <a:p>
-            <a:pPr lvl="1"/>
-            <a:r>
-              <a:rPr lang="en-US" sz="2000" dirty="0" smtClean="0"/>
-              <a:t>Imports the employee class to use each employee’s name</a:t>
-            </a:r>
-          </a:p>
-          <a:p>
-            <a:pPr lvl="1"/>
-            <a:r>
-              <a:rPr lang="en-US" sz="2000" dirty="0" smtClean="0"/>
-              <a:t>Searches through the document for the employee name</a:t>
-            </a:r>
-          </a:p>
-          <a:p>
-            <a:pPr lvl="1"/>
-            <a:r>
-              <a:rPr lang="en-US" sz="2000" dirty="0" smtClean="0"/>
-              <a:t>Checks comments for each review (All from a drop down)</a:t>
-            </a:r>
-          </a:p>
-          <a:p>
-            <a:pPr lvl="1"/>
-            <a:r>
-              <a:rPr lang="en-US" sz="2000" dirty="0" smtClean="0"/>
-              <a:t>Each string has different threat level</a:t>
-            </a:r>
-          </a:p>
-          <a:p>
-            <a:pPr lvl="1"/>
-            <a:r>
-              <a:rPr lang="en-US" sz="2000" dirty="0" smtClean="0"/>
-              <a:t>Averages all the threats and saves to employee class</a:t>
-            </a:r>
-            <a:endParaRPr lang="en-US" sz="2000" dirty="0"/>
-          </a:p>
-        </p:txBody>
-      </p:sp>
+      <p:pic>
+        <p:nvPicPr>
+          <p:cNvPr id="4" name="Picture 3" descr="citizenship_log_flow.jpg"/>
+          <p:cNvPicPr>
+            <a:picLocks/>
+          </p:cNvPicPr>
+          <p:nvPr/>
+        </p:nvPicPr>
+        <p:blipFill>
+          <a:blip r:embed="rId2">
+            <a:extLst>
+              <a:ext uri="{28A0092B-C50C-407E-A947-70E740481C1C}">
+                <a14:useLocalDpi xmlns:a14="http://schemas.microsoft.com/office/drawing/2010/main" val="0"/>
+              </a:ext>
+            </a:extLst>
+          </a:blip>
+          <a:stretch>
+            <a:fillRect/>
+          </a:stretch>
+        </p:blipFill>
+        <p:spPr>
+          <a:xfrm>
+            <a:off x="2438400" y="1353312"/>
+            <a:ext cx="7315200" cy="5504688"/>
+          </a:xfrm>
+          <a:prstGeom prst="rect">
+            <a:avLst/>
+          </a:prstGeom>
+        </p:spPr>
+      </p:pic>
     </p:spTree>
     <p:extLst>
       <p:ext uri="{BB962C8B-B14F-4D97-AF65-F5344CB8AC3E}">
-        <p14:creationId xmlns:p14="http://schemas.microsoft.com/office/powerpoint/2010/main" val="2157438941"/>
+        <p14:creationId xmlns:p14="http://schemas.microsoft.com/office/powerpoint/2010/main" val="2757089464"/>
       </p:ext>
     </p:extLst>
   </p:cSld>
   <p:clrMapOvr>
     <a:masterClrMapping/>
   </p:clrMapOvr>
-  <p:timing>
-    <p:tnLst>
-      <p:par>
-        <p:cTn xmlns:p14="http://schemas.microsoft.com/office/powerpoint/2010/main" id="1" dur="indefinite" restart="never" nodeType="tmRoot"/>
-      </p:par>
-    </p:tnLst>
-  </p:timing>
 </p:sld>
 </file>
 
@@ -8073,12 +7977,7 @@
             <p:ph type="title"/>
           </p:nvPr>
         </p:nvSpPr>
-        <p:spPr>
-          <a:xfrm>
-            <a:off x="2639107" y="901201"/>
-            <a:ext cx="8911687" cy="1280890"/>
-          </a:xfrm>
-        </p:spPr>
+        <p:spPr/>
         <p:txBody>
           <a:bodyPr/>
           <a:lstStyle/>
@@ -8103,28 +8002,26 @@
         </p:nvSpPr>
         <p:spPr/>
         <p:txBody>
-          <a:bodyPr>
-            <a:normAutofit/>
-          </a:bodyPr>
+          <a:bodyPr/>
           <a:lstStyle/>
           <a:p>
             <a:r>
-              <a:rPr lang="en-US" sz="2000" dirty="0">
+              <a:rPr lang="en-US" dirty="0">
                 <a:hlinkClick r:id="rId2"/>
               </a:rPr>
               <a:t>http://104.131.39.157</a:t>
             </a:r>
             <a:r>
-              <a:rPr lang="en-US" sz="2000" dirty="0" smtClean="0">
+              <a:rPr lang="en-US" dirty="0" smtClean="0">
                 <a:hlinkClick r:id="rId2"/>
               </a:rPr>
               <a:t>/</a:t>
             </a:r>
             <a:r>
-              <a:rPr lang="en-US" sz="2000" dirty="0" smtClean="0"/>
+              <a:rPr lang="en-US" dirty="0" smtClean="0"/>
               <a:t> </a:t>
             </a:r>
-            <a:endParaRPr lang="en-US" sz="2000" dirty="0"/>
+            <a:endParaRPr lang="en-US" dirty="0"/>
           </a:p>
         </p:txBody>
       </p:sp>
@@ -8150,8 +8047,8 @@
         </p:blipFill>
         <p:spPr>
           <a:xfrm>
-            <a:off x="3031183" y="3004221"/>
-            <a:ext cx="6296834" cy="2559452"/>
+            <a:off x="2296863" y="3314655"/>
+            <a:ext cx="7598275" cy="3088444"/>
           </a:xfrm>
           <a:prstGeom prst="rect">
             <a:avLst/>
@@ -8256,8 +8153,16 @@
             <a:pPr lvl="1"/>
             <a:r>
               <a:rPr lang="en-US" sz="2000" dirty="0" smtClean="0"/>
-              <a:t>Have to use predictive analysis to provide each employee with a threat level. (Inconsistent phone records, or flight plans)</a:t>
-            </a:r>
+              <a:t>Have to use predictive analysis to provide each employee with a threat level</a:t>
+            </a:r>
+            <a:r>
+              <a:rPr lang="en-US" sz="2000" dirty="0"/>
+              <a:t>. (Inconsistent phone records, or flight plans)</a:t>
+            </a:r>
+          </a:p>
+          <a:p>
+            <a:pPr lvl="1"/>
+            <a:endParaRPr lang="en-US" sz="2000" dirty="0" smtClean="0"/>
           </a:p>
           <a:p>
             <a:pPr marL="457200" lvl="1" indent="0">
@@ -8269,7 +8174,11 @@
             <a:pPr lvl="1"/>
             <a:r>
               <a:rPr lang="en-US" sz="2000" dirty="0" smtClean="0"/>
-              <a:t>Identify top potential insider threats, for each department, and company wide.</a:t>
+              <a:t>Identify top potential insider </a:t>
+            </a:r>
+            <a:r>
+              <a:rPr lang="en-US" sz="2000" dirty="0" smtClean="0"/>
+              <a:t>threats, for each department, and company wide.  </a:t>
             </a:r>
             <a:endParaRPr lang="en-US" sz="2000" dirty="0"/>
           </a:p>
@@ -8347,7 +8256,9 @@
         </p:nvSpPr>
         <p:spPr/>
         <p:txBody>
-          <a:bodyPr/>
+          <a:bodyPr>
+            <a:normAutofit/>
+          </a:bodyPr>
           <a:lstStyle/>
           <a:p>
             <a:r>
@@ -8374,7 +8285,7 @@
             </a:r>
           </a:p>
           <a:p>
-            <a:endParaRPr lang="en-US" dirty="0"/>
+            <a:endParaRPr lang="en-US" sz="2000" dirty="0"/>
           </a:p>
         </p:txBody>
       </p:sp>
@@ -8432,116 +8343,48 @@
           <a:p>
             <a:r>
               <a:rPr lang="en-US" dirty="0" smtClean="0"/>
-              <a:t>Main Function</a:t>
+              <a:t>Software Approach</a:t>
             </a:r>
             <a:endParaRPr lang="en-US" dirty="0"/>
           </a:p>
         </p:txBody>
       </p:sp>
-      <p:sp>
-        <p:nvSpPr>
-          <p:cNvPr id="3" name="Content Placeholder 2"/>
-          <p:cNvSpPr>
-            <a:spLocks noGrp="1"/>
-          </p:cNvSpPr>
+      <p:pic>
+        <p:nvPicPr>
+          <p:cNvPr id="4" name="Content Placeholder 3"/>
+          <p:cNvPicPr>
+            <a:picLocks noGrp="1" noChangeAspect="1"/>
+          </p:cNvPicPr>
           <p:nvPr>
             <p:ph idx="1"/>
           </p:nvPr>
-        </p:nvSpPr>
-        <p:spPr/>
-        <p:txBody>
-          <a:bodyPr>
-            <a:normAutofit/>
-          </a:bodyPr>
-          <a:lstStyle/>
-          <a:p>
-            <a:r>
-              <a:rPr lang="en-US" sz="2000" dirty="0" smtClean="0"/>
-              <a:t>We open the excel document using a read function</a:t>
-            </a:r>
-          </a:p>
-          <a:p>
-            <a:r>
-              <a:rPr lang="en-US" sz="2000" dirty="0" smtClean="0"/>
-              <a:t>On the basic information page we gather </a:t>
-            </a:r>
-            <a:r>
-              <a:rPr lang="en-US" sz="2000" dirty="0" smtClean="0"/>
-              <a:t>our </a:t>
-            </a:r>
-            <a:r>
-              <a:rPr lang="en-US" sz="2000" dirty="0" smtClean="0"/>
-              <a:t>searching criteria</a:t>
-            </a:r>
-          </a:p>
-          <a:p>
-            <a:r>
-              <a:rPr lang="en-US" sz="2000" dirty="0" smtClean="0"/>
-              <a:t>We save all of this criteria to an employee class</a:t>
-            </a:r>
-          </a:p>
-          <a:p>
-            <a:r>
-              <a:rPr lang="en-US" sz="2000" dirty="0" smtClean="0"/>
-              <a:t>This class is very important because we use it in all of the functions </a:t>
-            </a:r>
-          </a:p>
-          <a:p>
-            <a:r>
-              <a:rPr lang="en-US" sz="2000" dirty="0" smtClean="0"/>
-              <a:t>We save all of the information for each class in the main</a:t>
-            </a:r>
-          </a:p>
-          <a:p>
-            <a:r>
-              <a:rPr lang="en-US" sz="2000" dirty="0" smtClean="0"/>
-              <a:t>After we have </a:t>
-            </a:r>
-            <a:r>
-              <a:rPr lang="en-US" sz="2000" dirty="0" smtClean="0"/>
-              <a:t>iterated </a:t>
-            </a:r>
-            <a:r>
-              <a:rPr lang="en-US" sz="2000" dirty="0" smtClean="0"/>
-              <a:t>through the </a:t>
-            </a:r>
-            <a:r>
-              <a:rPr lang="en-US" sz="2000" dirty="0" smtClean="0"/>
-              <a:t>entire list of employees and assigned a threat level,</a:t>
-            </a:r>
-            <a:r>
-              <a:rPr lang="en-US" sz="2000" dirty="0" smtClean="0"/>
-              <a:t> </a:t>
-            </a:r>
-            <a:r>
-              <a:rPr lang="en-US" sz="2000" dirty="0" smtClean="0"/>
-              <a:t>we write the output to a .</a:t>
-            </a:r>
-            <a:r>
-              <a:rPr lang="en-US" sz="2000" dirty="0" err="1" smtClean="0"/>
-              <a:t>csv</a:t>
-            </a:r>
-            <a:endParaRPr lang="en-US" sz="2000" dirty="0"/>
-          </a:p>
-        </p:txBody>
-      </p:sp>
+        </p:nvPicPr>
+        <p:blipFill>
+          <a:blip r:embed="rId2"/>
+          <a:stretch>
+            <a:fillRect/>
+          </a:stretch>
+        </p:blipFill>
+        <p:spPr>
+          <a:xfrm>
+            <a:off x="2915729" y="1344282"/>
+            <a:ext cx="8281358" cy="5346877"/>
+          </a:xfrm>
+          <a:prstGeom prst="rect">
+            <a:avLst/>
+          </a:prstGeom>
+        </p:spPr>
+      </p:pic>
     </p:spTree>
     <p:extLst>
       <p:ext uri="{BB962C8B-B14F-4D97-AF65-F5344CB8AC3E}">
-        <p14:creationId xmlns:p14="http://schemas.microsoft.com/office/powerpoint/2010/main" val="1805307016"/>
+        <p14:creationId xmlns:p14="http://schemas.microsoft.com/office/powerpoint/2010/main" val="15241842"/>
       </p:ext>
     </p:extLst>
   </p:cSld>
   <p:clrMapOvr>
     <a:masterClrMapping/>
   </p:clrMapOvr>
-  <p:timing>
-    <p:tnLst>
-      <p:par>
-        <p:cTn xmlns:p14="http://schemas.microsoft.com/office/powerpoint/2010/main" id="1" dur="indefinite" restart="never" nodeType="tmRoot"/>
-      </p:par>
-    </p:tnLst>
-  </p:timing>
 </p:sld>
 </file>
 
@@ -8562,30 +8405,49 @@
           <a:chExt cx="0" cy="0"/>
         </a:xfrm>
       </p:grpSpPr>
+      <p:sp>
+        <p:nvSpPr>
+          <p:cNvPr id="2" name="Title 1"/>
+          <p:cNvSpPr>
+            <a:spLocks noGrp="1"/>
+          </p:cNvSpPr>
+          <p:nvPr>
+            <p:ph type="title"/>
+          </p:nvPr>
+        </p:nvSpPr>
+        <p:spPr/>
+        <p:txBody>
+          <a:bodyPr/>
+          <a:lstStyle/>
+          <a:p>
+            <a:r>
+              <a:rPr lang="en-US" dirty="0" smtClean="0"/>
+              <a:t>CSV Data</a:t>
+            </a:r>
+            <a:endParaRPr lang="en-US" dirty="0"/>
+          </a:p>
+        </p:txBody>
+      </p:sp>
       <p:pic>
         <p:nvPicPr>
-          <p:cNvPr id="6" name="Picture 5" descr="functions.jpg"/>
+          <p:cNvPr id="5" name="Content Placeholder 4"/>
           <p:cNvPicPr>
-            <a:picLocks noChangeAspect="1"/>
+            <a:picLocks noGrp="1" noChangeAspect="1"/>
           </p:cNvPicPr>
-          <p:nvPr/>
+          <p:nvPr>
+            <p:ph idx="1"/>
+          </p:nvPr>
         </p:nvPicPr>
         <p:blipFill>
-          <a:blip r:embed="rId2">
-            <a:extLst>
-              <a:ext uri="{28A0092B-C50C-407E-A947-70E740481C1C}">
-                <a14:useLocalDpi xmlns:a14="http://schemas.microsoft.com/office/drawing/2010/main" val="0"/>
-              </a:ext>
-            </a:extLst>
-          </a:blip>
+          <a:blip r:embed="rId2"/>
           <a:stretch>
             <a:fillRect/>
           </a:stretch>
         </p:blipFill>
         <p:spPr>
           <a:xfrm>
-            <a:off x="2029377" y="554182"/>
-            <a:ext cx="9758531" cy="6170002"/>
+            <a:off x="2189724" y="1382761"/>
+            <a:ext cx="9611211" cy="5337215"/>
           </a:xfrm>
           <a:prstGeom prst="rect">
             <a:avLst/>
@@ -8595,20 +8457,13 @@
     </p:spTree>
     <p:extLst>
       <p:ext uri="{BB962C8B-B14F-4D97-AF65-F5344CB8AC3E}">
-        <p14:creationId xmlns:p14="http://schemas.microsoft.com/office/powerpoint/2010/main" val="2155296227"/>
+        <p14:creationId xmlns:p14="http://schemas.microsoft.com/office/powerpoint/2010/main" val="4282342701"/>
       </p:ext>
     </p:extLst>
   </p:cSld>
   <p:clrMapOvr>
     <a:masterClrMapping/>
   </p:clrMapOvr>
-  <p:timing>
-    <p:tnLst>
-      <p:par>
-        <p:cTn xmlns:p14="http://schemas.microsoft.com/office/powerpoint/2010/main" id="1" dur="indefinite" restart="never" nodeType="tmRoot"/>
-      </p:par>
-    </p:tnLst>
-  </p:timing>
 </p:sld>
 </file>
 
@@ -8646,76 +8501,42 @@
           <a:p>
             <a:r>
               <a:rPr lang="en-US" dirty="0" smtClean="0"/>
-              <a:t>Individual Records </a:t>
+              <a:t>Main Function</a:t>
             </a:r>
             <a:endParaRPr lang="en-US" dirty="0"/>
           </a:p>
         </p:txBody>
       </p:sp>
-      <p:sp>
-        <p:nvSpPr>
-          <p:cNvPr id="3" name="Content Placeholder 2"/>
-          <p:cNvSpPr>
-            <a:spLocks noGrp="1"/>
-          </p:cNvSpPr>
+      <p:pic>
+        <p:nvPicPr>
+          <p:cNvPr id="4" name="Content Placeholder 3"/>
+          <p:cNvPicPr>
+            <a:picLocks noGrp="1" noChangeAspect="1"/>
+          </p:cNvPicPr>
           <p:nvPr>
             <p:ph idx="1"/>
           </p:nvPr>
-        </p:nvSpPr>
-        <p:spPr/>
-        <p:txBody>
-          <a:bodyPr>
-            <a:normAutofit/>
-          </a:bodyPr>
-          <a:lstStyle/>
-          <a:p>
-            <a:r>
-              <a:rPr lang="en-US" sz="2000" dirty="0" smtClean="0"/>
-              <a:t>We analyzed a few different records we were given</a:t>
-            </a:r>
-          </a:p>
-          <a:p>
-            <a:pPr lvl="1"/>
-            <a:r>
-              <a:rPr lang="en-US" sz="2000" dirty="0" smtClean="0"/>
-              <a:t>Phone records </a:t>
-            </a:r>
-          </a:p>
-          <a:p>
-            <a:pPr lvl="1"/>
-            <a:r>
-              <a:rPr lang="en-US" sz="2000" dirty="0" smtClean="0"/>
-              <a:t>Travel history</a:t>
-            </a:r>
-          </a:p>
-          <a:p>
-            <a:pPr lvl="1"/>
-            <a:r>
-              <a:rPr lang="en-US" sz="2000" dirty="0" smtClean="0"/>
-              <a:t>Citizenship </a:t>
-            </a:r>
-          </a:p>
-          <a:p>
-            <a:pPr lvl="1"/>
-            <a:r>
-              <a:rPr lang="en-US" sz="2000" dirty="0" smtClean="0"/>
-              <a:t>Server access logs</a:t>
-            </a:r>
-          </a:p>
-          <a:p>
-            <a:pPr lvl="1"/>
-            <a:r>
-              <a:rPr lang="en-US" sz="2000" dirty="0" smtClean="0"/>
-              <a:t>Job History </a:t>
-            </a:r>
-            <a:endParaRPr lang="en-US" sz="2000" dirty="0"/>
-          </a:p>
-        </p:txBody>
-      </p:sp>
+        </p:nvPicPr>
+        <p:blipFill>
+          <a:blip r:embed="rId2"/>
+          <a:stretch>
+            <a:fillRect/>
+          </a:stretch>
+        </p:blipFill>
+        <p:spPr>
+          <a:xfrm>
+            <a:off x="3260785" y="1400376"/>
+            <a:ext cx="7522234" cy="5202176"/>
+          </a:xfrm>
+          <a:prstGeom prst="rect">
+            <a:avLst/>
+          </a:prstGeom>
+        </p:spPr>
+      </p:pic>
     </p:spTree>
     <p:extLst>
       <p:ext uri="{BB962C8B-B14F-4D97-AF65-F5344CB8AC3E}">
-        <p14:creationId xmlns:p14="http://schemas.microsoft.com/office/powerpoint/2010/main" val="3926486592"/>
+        <p14:creationId xmlns:p14="http://schemas.microsoft.com/office/powerpoint/2010/main" val="1513977885"/>
       </p:ext>
     </p:extLst>
   </p:cSld>
@@ -8759,102 +8580,42 @@
           <a:p>
             <a:r>
               <a:rPr lang="en-US" dirty="0" smtClean="0"/>
-              <a:t>Phone Records</a:t>
-            </a:r>
-            <a:br>
-              <a:rPr lang="en-US" dirty="0" smtClean="0"/>
-            </a:br>
+              <a:t>Threat Level: Air Travel</a:t>
+            </a:r>
             <a:endParaRPr lang="en-US" dirty="0"/>
           </a:p>
         </p:txBody>
       </p:sp>
-      <p:sp>
-        <p:nvSpPr>
-          <p:cNvPr id="3" name="Content Placeholder 2"/>
-          <p:cNvSpPr>
-            <a:spLocks noGrp="1"/>
-          </p:cNvSpPr>
+      <p:pic>
+        <p:nvPicPr>
+          <p:cNvPr id="5" name="Content Placeholder 4"/>
+          <p:cNvPicPr>
+            <a:picLocks noGrp="1" noChangeAspect="1"/>
+          </p:cNvPicPr>
           <p:nvPr>
             <p:ph idx="1"/>
           </p:nvPr>
-        </p:nvSpPr>
-        <p:spPr/>
-        <p:txBody>
-          <a:bodyPr>
-            <a:normAutofit lnSpcReduction="10000"/>
-          </a:bodyPr>
-          <a:lstStyle/>
-          <a:p>
-            <a:r>
-              <a:rPr lang="en-US" sz="2000" dirty="0" smtClean="0"/>
-              <a:t>The level of threat for phone records was defined by two records</a:t>
-            </a:r>
-          </a:p>
-          <a:p>
-            <a:pPr lvl="1"/>
-            <a:r>
-              <a:rPr lang="en-US" sz="2000" dirty="0" smtClean="0"/>
-              <a:t>Was the number a unique number, and how long was the call</a:t>
-            </a:r>
-          </a:p>
-          <a:p>
-            <a:pPr lvl="1"/>
-            <a:r>
-              <a:rPr lang="en-US" sz="2000" dirty="0" smtClean="0"/>
-              <a:t>Where was the source of the call, and where was the destination </a:t>
-            </a:r>
-          </a:p>
-          <a:p>
-            <a:r>
-              <a:rPr lang="en-US" sz="2000" dirty="0" smtClean="0"/>
-              <a:t>Software Walkthrough</a:t>
-            </a:r>
-          </a:p>
-          <a:p>
-            <a:pPr lvl="1"/>
-            <a:r>
-              <a:rPr lang="en-US" sz="2000" dirty="0" smtClean="0"/>
-              <a:t>Checks for phone numbers occurring once</a:t>
-            </a:r>
-          </a:p>
-          <a:p>
-            <a:pPr lvl="1"/>
-            <a:r>
-              <a:rPr lang="en-US" sz="2000" dirty="0" smtClean="0"/>
-              <a:t>Checks the length of call</a:t>
-            </a:r>
-          </a:p>
-          <a:p>
-            <a:pPr lvl="1"/>
-            <a:r>
-              <a:rPr lang="en-US" sz="2000" dirty="0" smtClean="0"/>
-              <a:t>Assigns threat level based off source and destination </a:t>
-            </a:r>
-          </a:p>
-          <a:p>
-            <a:pPr lvl="1"/>
-            <a:r>
-              <a:rPr lang="en-US" sz="2000" dirty="0" smtClean="0"/>
-              <a:t>Returns arrays with employee names </a:t>
-            </a:r>
-          </a:p>
-          <a:p>
-            <a:pPr lvl="1"/>
-            <a:r>
-              <a:rPr lang="en-US" sz="2000" dirty="0" smtClean="0"/>
-              <a:t>Results are stored in the employee class</a:t>
-            </a:r>
-          </a:p>
-          <a:p>
-            <a:pPr lvl="1"/>
-            <a:endParaRPr lang="en-US" dirty="0"/>
-          </a:p>
-        </p:txBody>
-      </p:sp>
+        </p:nvPicPr>
+        <p:blipFill>
+          <a:blip r:embed="rId2"/>
+          <a:stretch>
+            <a:fillRect/>
+          </a:stretch>
+        </p:blipFill>
+        <p:spPr>
+          <a:xfrm>
+            <a:off x="3752490" y="1264555"/>
+            <a:ext cx="5546785" cy="5498149"/>
+          </a:xfrm>
+          <a:prstGeom prst="rect">
+            <a:avLst/>
+          </a:prstGeom>
+        </p:spPr>
+      </p:pic>
     </p:spTree>
     <p:extLst>
       <p:ext uri="{BB962C8B-B14F-4D97-AF65-F5344CB8AC3E}">
-        <p14:creationId xmlns:p14="http://schemas.microsoft.com/office/powerpoint/2010/main" val="1176215862"/>
+        <p14:creationId xmlns:p14="http://schemas.microsoft.com/office/powerpoint/2010/main" val="1584206079"/>
       </p:ext>
     </p:extLst>
   </p:cSld>
@@ -8897,84 +8658,51 @@
           <a:lstStyle/>
           <a:p>
             <a:r>
+              <a:rPr lang="en-US" dirty="0"/>
+              <a:t>Threat Level: </a:t>
+            </a:r>
+            <a:r>
               <a:rPr lang="en-US" dirty="0" smtClean="0"/>
-              <a:t>Travel History</a:t>
+              <a:t>Phone Records</a:t>
             </a:r>
             <a:endParaRPr lang="en-US" dirty="0"/>
           </a:p>
         </p:txBody>
       </p:sp>
-      <p:sp>
-        <p:nvSpPr>
-          <p:cNvPr id="3" name="Content Placeholder 2"/>
-          <p:cNvSpPr>
-            <a:spLocks noGrp="1"/>
-          </p:cNvSpPr>
-          <p:nvPr>
-            <p:ph idx="1"/>
-          </p:nvPr>
-        </p:nvSpPr>
-        <p:spPr/>
-        <p:txBody>
-          <a:bodyPr/>
-          <a:lstStyle/>
-          <a:p>
-            <a:r>
-              <a:rPr lang="en-US" sz="2000" dirty="0" smtClean="0"/>
-              <a:t>Threat level for air travel was defined by one record</a:t>
-            </a:r>
-          </a:p>
-          <a:p>
-            <a:pPr lvl="1"/>
-            <a:r>
-              <a:rPr lang="en-US" sz="2000" dirty="0" smtClean="0"/>
-              <a:t>How many flights the person booked in a single day</a:t>
-            </a:r>
-          </a:p>
-          <a:p>
-            <a:r>
-              <a:rPr lang="en-US" sz="2000" dirty="0" smtClean="0"/>
-              <a:t>Software Walkthrough </a:t>
-            </a:r>
-          </a:p>
-          <a:p>
-            <a:pPr lvl="1"/>
-            <a:r>
-              <a:rPr lang="en-US" sz="2000" dirty="0" smtClean="0"/>
-              <a:t>Import employee class to function</a:t>
-            </a:r>
-          </a:p>
-          <a:p>
-            <a:pPr lvl="1"/>
-            <a:r>
-              <a:rPr lang="en-US" sz="2000" dirty="0" smtClean="0"/>
-              <a:t>Checks the travel record for flights relating to employee name</a:t>
-            </a:r>
-          </a:p>
-          <a:p>
-            <a:pPr lvl="1"/>
-            <a:r>
-              <a:rPr lang="en-US" sz="2000" dirty="0" smtClean="0"/>
-              <a:t>If multiple booked on the same day, increase threat level</a:t>
-            </a:r>
-          </a:p>
-          <a:p>
-            <a:pPr lvl="1"/>
-            <a:r>
-              <a:rPr lang="en-US" sz="2000" dirty="0" smtClean="0"/>
-              <a:t>Returns a threat probability and saves it to the class</a:t>
-            </a:r>
-          </a:p>
-          <a:p>
-            <a:pPr lvl="1"/>
-            <a:endParaRPr lang="en-US" dirty="0" smtClean="0"/>
-          </a:p>
-        </p:txBody>
-      </p:sp>
+      <p:pic>
+        <p:nvPicPr>
+          <p:cNvPr id="4" name="Picture 3" descr="phone_log_flow.jpg"/>
+          <p:cNvPicPr>
+            <a:picLocks/>
+          </p:cNvPicPr>
+          <p:nvPr/>
+        </p:nvPicPr>
+        <p:blipFill>
+          <a:blip r:embed="rId2">
+            <a:extLst>
+              <a:ext uri="{28A0092B-C50C-407E-A947-70E740481C1C}">
+                <a14:useLocalDpi xmlns:a14="http://schemas.microsoft.com/office/drawing/2010/main" val="0"/>
+              </a:ext>
+            </a:extLst>
+          </a:blip>
+          <a:stretch>
+            <a:fillRect/>
+          </a:stretch>
+        </p:blipFill>
+        <p:spPr>
+          <a:xfrm>
+            <a:off x="3320796" y="1319201"/>
+            <a:ext cx="5550408" cy="5504688"/>
+          </a:xfrm>
+          <a:prstGeom prst="rect">
+            <a:avLst/>
+          </a:prstGeom>
+        </p:spPr>
+      </p:pic>
     </p:spTree>
     <p:extLst>
       <p:ext uri="{BB962C8B-B14F-4D97-AF65-F5344CB8AC3E}">
-        <p14:creationId xmlns:p14="http://schemas.microsoft.com/office/powerpoint/2010/main" val="800894778"/>
+        <p14:creationId xmlns:p14="http://schemas.microsoft.com/office/powerpoint/2010/main" val="1515267933"/>
       </p:ext>
     </p:extLst>
   </p:cSld>
@@ -9017,83 +8745,51 @@
           <a:lstStyle/>
           <a:p>
             <a:r>
+              <a:rPr lang="en-US" dirty="0"/>
+              <a:t>Threat Level: </a:t>
+            </a:r>
+            <a:r>
               <a:rPr lang="en-US" dirty="0" smtClean="0"/>
-              <a:t>Citizenship</a:t>
+              <a:t>Server Access Logs</a:t>
             </a:r>
             <a:endParaRPr lang="en-US" dirty="0"/>
           </a:p>
         </p:txBody>
       </p:sp>
-      <p:sp>
-        <p:nvSpPr>
-          <p:cNvPr id="3" name="Content Placeholder 2"/>
-          <p:cNvSpPr>
-            <a:spLocks noGrp="1"/>
-          </p:cNvSpPr>
-          <p:nvPr>
-            <p:ph idx="1"/>
-          </p:nvPr>
-        </p:nvSpPr>
-        <p:spPr/>
-        <p:txBody>
-          <a:bodyPr>
-            <a:normAutofit/>
-          </a:bodyPr>
-          <a:lstStyle/>
-          <a:p>
-            <a:r>
-              <a:rPr lang="en-US" sz="2000" dirty="0" smtClean="0"/>
-              <a:t>The citizenship threat was defined by one record </a:t>
-            </a:r>
-          </a:p>
-          <a:p>
-            <a:pPr lvl="1"/>
-            <a:r>
-              <a:rPr lang="en-US" sz="2000" dirty="0" smtClean="0"/>
-              <a:t>Where was the person born </a:t>
-            </a:r>
-          </a:p>
-          <a:p>
-            <a:r>
-              <a:rPr lang="en-US" sz="2000" dirty="0" smtClean="0"/>
-              <a:t>Software Walkthrough</a:t>
-            </a:r>
-          </a:p>
-          <a:p>
-            <a:pPr lvl="1"/>
-            <a:r>
-              <a:rPr lang="en-US" sz="2000" dirty="0" smtClean="0"/>
-              <a:t>Import the employee class to get name of employee</a:t>
-            </a:r>
-          </a:p>
-          <a:p>
-            <a:pPr lvl="1"/>
-            <a:r>
-              <a:rPr lang="en-US" sz="2000" dirty="0" smtClean="0"/>
-              <a:t>Searches through citizenship tab to locate employee</a:t>
-            </a:r>
-          </a:p>
-          <a:p>
-            <a:pPr lvl="1"/>
-            <a:r>
-              <a:rPr lang="en-US" sz="2000" dirty="0" smtClean="0"/>
-              <a:t>Pulls from excel document the employee’s birth place</a:t>
-            </a:r>
-          </a:p>
-          <a:p>
-            <a:pPr lvl="1"/>
-            <a:r>
-              <a:rPr lang="en-US" sz="2000" dirty="0" smtClean="0"/>
-              <a:t>Assigns them a threat level based on their country of origin </a:t>
-            </a:r>
-            <a:endParaRPr lang="en-US" sz="2000" dirty="0"/>
-          </a:p>
-        </p:txBody>
-      </p:sp>
+      <p:pic>
+        <p:nvPicPr>
+          <p:cNvPr id="5" name="Picture 4" descr="access_log_flow.jpg"/>
+          <p:cNvPicPr>
+            <a:picLocks/>
+          </p:cNvPicPr>
+          <p:nvPr/>
+        </p:nvPicPr>
+        <p:blipFill>
+          <a:blip r:embed="rId2">
+            <a:extLst>
+              <a:ext uri="{28A0092B-C50C-407E-A947-70E740481C1C}">
+                <a14:useLocalDpi xmlns:a14="http://schemas.microsoft.com/office/drawing/2010/main" val="0"/>
+              </a:ext>
+            </a:extLst>
+          </a:blip>
+          <a:stretch>
+            <a:fillRect/>
+          </a:stretch>
+        </p:blipFill>
+        <p:spPr>
+          <a:xfrm>
+            <a:off x="4724400" y="1353312"/>
+            <a:ext cx="2743200" cy="5504688"/>
+          </a:xfrm>
+          <a:prstGeom prst="rect">
+            <a:avLst/>
+          </a:prstGeom>
+        </p:spPr>
+      </p:pic>
     </p:spTree>
     <p:extLst>
       <p:ext uri="{BB962C8B-B14F-4D97-AF65-F5344CB8AC3E}">
-        <p14:creationId xmlns:p14="http://schemas.microsoft.com/office/powerpoint/2010/main" val="314310355"/>
+        <p14:creationId xmlns:p14="http://schemas.microsoft.com/office/powerpoint/2010/main" val="4072575856"/>
       </p:ext>
     </p:extLst>
   </p:cSld>

</xml_diff>